<commit_message>
Updates to TLS slides
</commit_message>
<xml_diff>
--- a/slides/SSL.pptx
+++ b/slides/SSL.pptx
@@ -5,10 +5,10 @@
     <p:sldMasterId id="2147483949" r:id="rId1"/>
   </p:sldMasterIdLst>
   <p:notesMasterIdLst>
-    <p:notesMasterId r:id="rId19"/>
+    <p:notesMasterId r:id="rId23"/>
   </p:notesMasterIdLst>
   <p:handoutMasterIdLst>
-    <p:handoutMasterId r:id="rId20"/>
+    <p:handoutMasterId r:id="rId24"/>
   </p:handoutMasterIdLst>
   <p:sldIdLst>
     <p:sldId id="285" r:id="rId2"/>
@@ -20,14 +20,18 @@
     <p:sldId id="295" r:id="rId8"/>
     <p:sldId id="296" r:id="rId9"/>
     <p:sldId id="288" r:id="rId10"/>
-    <p:sldId id="289" r:id="rId11"/>
-    <p:sldId id="290" r:id="rId12"/>
-    <p:sldId id="291" r:id="rId13"/>
-    <p:sldId id="292" r:id="rId14"/>
-    <p:sldId id="293" r:id="rId15"/>
-    <p:sldId id="299" r:id="rId16"/>
-    <p:sldId id="300" r:id="rId17"/>
-    <p:sldId id="294" r:id="rId18"/>
+    <p:sldId id="306" r:id="rId11"/>
+    <p:sldId id="304" r:id="rId12"/>
+    <p:sldId id="261" r:id="rId13"/>
+    <p:sldId id="268" r:id="rId14"/>
+    <p:sldId id="289" r:id="rId15"/>
+    <p:sldId id="290" r:id="rId16"/>
+    <p:sldId id="291" r:id="rId17"/>
+    <p:sldId id="292" r:id="rId18"/>
+    <p:sldId id="293" r:id="rId19"/>
+    <p:sldId id="299" r:id="rId20"/>
+    <p:sldId id="300" r:id="rId21"/>
+    <p:sldId id="294" r:id="rId22"/>
   </p:sldIdLst>
   <p:sldSz cx="9144000" cy="6858000" type="screen4x3"/>
   <p:notesSz cx="6858000" cy="9144000"/>
@@ -7445,7 +7449,7 @@
               <a:pPr>
                 <a:defRPr/>
               </a:pPr>
-              <a:t>11</a:t>
+              <a:t>15</a:t>
             </a:fld>
             <a:endParaRPr lang="en-AU"/>
           </a:p>
@@ -11249,6 +11253,1333 @@
       </p:grpSpPr>
       <p:sp>
         <p:nvSpPr>
+          <p:cNvPr id="2" name="Title 1">
+            <a:extLst>
+              <a:ext uri="{FF2B5EF4-FFF2-40B4-BE49-F238E27FC236}">
+                <a16:creationId xmlns:a16="http://schemas.microsoft.com/office/drawing/2014/main" id="{1F0C91CD-BF80-4EA8-9431-E78F2BE483AA}"/>
+              </a:ext>
+            </a:extLst>
+          </p:cNvPr>
+          <p:cNvSpPr>
+            <a:spLocks noGrp="1"/>
+          </p:cNvSpPr>
+          <p:nvPr>
+            <p:ph type="title"/>
+          </p:nvPr>
+        </p:nvSpPr>
+        <p:spPr/>
+        <p:txBody>
+          <a:bodyPr/>
+          <a:lstStyle/>
+          <a:p>
+            <a:r>
+              <a:rPr lang="en-US" dirty="0"/>
+              <a:t>POPULAR TLS LIBRARIES</a:t>
+            </a:r>
+            <a:endParaRPr lang="it-IT" dirty="0"/>
+          </a:p>
+        </p:txBody>
+      </p:sp>
+      <p:sp>
+        <p:nvSpPr>
+          <p:cNvPr id="3" name="Content Placeholder 2">
+            <a:extLst>
+              <a:ext uri="{FF2B5EF4-FFF2-40B4-BE49-F238E27FC236}">
+                <a16:creationId xmlns:a16="http://schemas.microsoft.com/office/drawing/2014/main" id="{D541EF4A-FC2F-489F-905F-0F384777E518}"/>
+              </a:ext>
+            </a:extLst>
+          </p:cNvPr>
+          <p:cNvSpPr>
+            <a:spLocks noGrp="1"/>
+          </p:cNvSpPr>
+          <p:nvPr>
+            <p:ph idx="1"/>
+          </p:nvPr>
+        </p:nvSpPr>
+        <p:spPr/>
+        <p:txBody>
+          <a:bodyPr/>
+          <a:lstStyle/>
+          <a:p>
+            <a:r>
+              <a:rPr lang="en-US" dirty="0"/>
+              <a:t>OPENSSL (Open source)</a:t>
+            </a:r>
+          </a:p>
+          <a:p>
+            <a:r>
+              <a:rPr lang="en-US" dirty="0"/>
+              <a:t>LibreSSL (Open source)</a:t>
+            </a:r>
+          </a:p>
+          <a:p>
+            <a:r>
+              <a:rPr lang="en-US" dirty="0" err="1"/>
+              <a:t>BoringSSL</a:t>
+            </a:r>
+            <a:r>
+              <a:rPr lang="en-US" dirty="0"/>
+              <a:t> (Google)</a:t>
+            </a:r>
+          </a:p>
+          <a:p>
+            <a:r>
+              <a:rPr lang="en-US" dirty="0" err="1"/>
+              <a:t>Schannel</a:t>
+            </a:r>
+            <a:r>
+              <a:rPr lang="en-US" dirty="0"/>
+              <a:t> (Microsoft)</a:t>
+            </a:r>
+          </a:p>
+          <a:p>
+            <a:r>
+              <a:rPr lang="en-US" dirty="0"/>
+              <a:t>Secure Transport (Apple)</a:t>
+            </a:r>
+            <a:endParaRPr lang="it-IT" dirty="0"/>
+          </a:p>
+        </p:txBody>
+      </p:sp>
+    </p:spTree>
+    <p:extLst>
+      <p:ext uri="{BB962C8B-B14F-4D97-AF65-F5344CB8AC3E}">
+        <p14:creationId xmlns:p14="http://schemas.microsoft.com/office/powerpoint/2010/main" val="1520512134"/>
+      </p:ext>
+    </p:extLst>
+  </p:cSld>
+  <p:clrMapOvr>
+    <a:masterClrMapping/>
+  </p:clrMapOvr>
+</p:sld>
+</file>
+
+<file path=ppt/slides/slide11.xml><?xml version="1.0" encoding="utf-8"?>
+<p:sld xmlns:a="http://schemas.openxmlformats.org/drawingml/2006/main" xmlns:r="http://schemas.openxmlformats.org/officeDocument/2006/relationships" xmlns:p="http://schemas.openxmlformats.org/presentationml/2006/main">
+  <p:cSld>
+    <p:spTree>
+      <p:nvGrpSpPr>
+        <p:cNvPr id="1" name=""/>
+        <p:cNvGrpSpPr/>
+        <p:nvPr/>
+      </p:nvGrpSpPr>
+      <p:grpSpPr>
+        <a:xfrm>
+          <a:off x="0" y="0"/>
+          <a:ext cx="0" cy="0"/>
+          <a:chOff x="0" y="0"/>
+          <a:chExt cx="0" cy="0"/>
+        </a:xfrm>
+      </p:grpSpPr>
+      <p:sp>
+        <p:nvSpPr>
+          <p:cNvPr id="2" name="Title 1">
+            <a:extLst>
+              <a:ext uri="{FF2B5EF4-FFF2-40B4-BE49-F238E27FC236}">
+                <a16:creationId xmlns:a16="http://schemas.microsoft.com/office/drawing/2014/main" id="{6CE23F2E-5078-4FB3-9180-3E97E5B5A364}"/>
+              </a:ext>
+            </a:extLst>
+          </p:cNvPr>
+          <p:cNvSpPr>
+            <a:spLocks noGrp="1"/>
+          </p:cNvSpPr>
+          <p:nvPr>
+            <p:ph type="title"/>
+          </p:nvPr>
+        </p:nvSpPr>
+        <p:spPr/>
+        <p:txBody>
+          <a:bodyPr/>
+          <a:lstStyle/>
+          <a:p>
+            <a:r>
+              <a:rPr lang="en-US" dirty="0"/>
+              <a:t>SSLSTRIP</a:t>
+            </a:r>
+            <a:endParaRPr lang="it-IT" dirty="0"/>
+          </a:p>
+        </p:txBody>
+      </p:sp>
+      <p:sp>
+        <p:nvSpPr>
+          <p:cNvPr id="3" name="Content Placeholder 2">
+            <a:extLst>
+              <a:ext uri="{FF2B5EF4-FFF2-40B4-BE49-F238E27FC236}">
+                <a16:creationId xmlns:a16="http://schemas.microsoft.com/office/drawing/2014/main" id="{298CBE50-6CE8-4263-BE4E-D38E51E9A142}"/>
+              </a:ext>
+            </a:extLst>
+          </p:cNvPr>
+          <p:cNvSpPr>
+            <a:spLocks noGrp="1"/>
+          </p:cNvSpPr>
+          <p:nvPr>
+            <p:ph idx="1"/>
+          </p:nvPr>
+        </p:nvSpPr>
+        <p:spPr/>
+        <p:txBody>
+          <a:bodyPr/>
+          <a:lstStyle/>
+          <a:p>
+            <a:r>
+              <a:rPr lang="en-US" dirty="0"/>
+              <a:t>Fallback attack from https to http</a:t>
+            </a:r>
+          </a:p>
+          <a:p>
+            <a:r>
+              <a:rPr lang="en-US" dirty="0"/>
+              <a:t>Still tremendous impact</a:t>
+            </a:r>
+          </a:p>
+          <a:p>
+            <a:r>
+              <a:rPr lang="en-US" dirty="0"/>
+              <a:t>Mitigated by HSTS headers</a:t>
+            </a:r>
+            <a:endParaRPr lang="it-IT" dirty="0"/>
+          </a:p>
+        </p:txBody>
+      </p:sp>
+      <p:pic>
+        <p:nvPicPr>
+          <p:cNvPr id="1028" name="Picture 4" descr="SSLStrip">
+            <a:extLst>
+              <a:ext uri="{FF2B5EF4-FFF2-40B4-BE49-F238E27FC236}">
+                <a16:creationId xmlns:a16="http://schemas.microsoft.com/office/drawing/2014/main" id="{10B4387A-F0DC-4F0C-936B-4DF33CF2D0F0}"/>
+              </a:ext>
+            </a:extLst>
+          </p:cNvPr>
+          <p:cNvPicPr>
+            <a:picLocks noChangeAspect="1" noChangeArrowheads="1"/>
+          </p:cNvPicPr>
+          <p:nvPr/>
+        </p:nvPicPr>
+        <p:blipFill>
+          <a:blip r:embed="rId2">
+            <a:extLst>
+              <a:ext uri="{28A0092B-C50C-407E-A947-70E740481C1C}">
+                <a14:useLocalDpi xmlns:a14="http://schemas.microsoft.com/office/drawing/2010/main" val="0"/>
+              </a:ext>
+            </a:extLst>
+          </a:blip>
+          <a:srcRect/>
+          <a:stretch>
+            <a:fillRect/>
+          </a:stretch>
+        </p:blipFill>
+        <p:spPr bwMode="auto">
+          <a:xfrm>
+            <a:off x="904875" y="4005064"/>
+            <a:ext cx="7334250" cy="1600200"/>
+          </a:xfrm>
+          <a:prstGeom prst="rect">
+            <a:avLst/>
+          </a:prstGeom>
+          <a:noFill/>
+          <a:extLst>
+            <a:ext uri="{909E8E84-426E-40DD-AFC4-6F175D3DCCD1}">
+              <a14:hiddenFill xmlns:a14="http://schemas.microsoft.com/office/drawing/2010/main">
+                <a:solidFill>
+                  <a:srgbClr val="FFFFFF"/>
+                </a:solidFill>
+              </a14:hiddenFill>
+            </a:ext>
+          </a:extLst>
+        </p:spPr>
+      </p:pic>
+    </p:spTree>
+    <p:extLst>
+      <p:ext uri="{BB962C8B-B14F-4D97-AF65-F5344CB8AC3E}">
+        <p14:creationId xmlns:p14="http://schemas.microsoft.com/office/powerpoint/2010/main" val="4219973543"/>
+      </p:ext>
+    </p:extLst>
+  </p:cSld>
+  <p:clrMapOvr>
+    <a:masterClrMapping/>
+  </p:clrMapOvr>
+</p:sld>
+</file>
+
+<file path=ppt/slides/slide12.xml><?xml version="1.0" encoding="utf-8"?>
+<p:sld xmlns:a="http://schemas.openxmlformats.org/drawingml/2006/main" xmlns:r="http://schemas.openxmlformats.org/officeDocument/2006/relationships" xmlns:p="http://schemas.openxmlformats.org/presentationml/2006/main">
+  <p:cSld>
+    <p:spTree>
+      <p:nvGrpSpPr>
+        <p:cNvPr id="1" name=""/>
+        <p:cNvGrpSpPr/>
+        <p:nvPr/>
+      </p:nvGrpSpPr>
+      <p:grpSpPr>
+        <a:xfrm>
+          <a:off x="0" y="0"/>
+          <a:ext cx="0" cy="0"/>
+          <a:chOff x="0" y="0"/>
+          <a:chExt cx="0" cy="0"/>
+        </a:xfrm>
+      </p:grpSpPr>
+      <p:sp>
+        <p:nvSpPr>
+          <p:cNvPr id="2" name="Titolo 1">
+            <a:extLst>
+              <a:ext uri="{FF2B5EF4-FFF2-40B4-BE49-F238E27FC236}">
+                <a16:creationId xmlns:a16="http://schemas.microsoft.com/office/drawing/2014/main" id="{732E3563-03AE-429A-A9CD-0698ADB5FCD4}"/>
+              </a:ext>
+            </a:extLst>
+          </p:cNvPr>
+          <p:cNvSpPr>
+            <a:spLocks noGrp="1"/>
+          </p:cNvSpPr>
+          <p:nvPr>
+            <p:ph type="title"/>
+          </p:nvPr>
+        </p:nvSpPr>
+        <p:spPr>
+          <a:xfrm>
+            <a:off x="4815349" y="1314450"/>
+            <a:ext cx="3841955" cy="1428750"/>
+          </a:xfrm>
+        </p:spPr>
+        <p:txBody>
+          <a:bodyPr>
+            <a:normAutofit/>
+          </a:bodyPr>
+          <a:lstStyle/>
+          <a:p>
+            <a:pPr algn="ctr"/>
+            <a:r>
+              <a:rPr lang="it-IT" sz="2400" dirty="0" err="1"/>
+              <a:t>heartbeat</a:t>
+            </a:r>
+            <a:endParaRPr lang="it-IT" dirty="0"/>
+          </a:p>
+        </p:txBody>
+      </p:sp>
+      <p:sp>
+        <p:nvSpPr>
+          <p:cNvPr id="3" name="Segnaposto contenuto 2">
+            <a:extLst>
+              <a:ext uri="{FF2B5EF4-FFF2-40B4-BE49-F238E27FC236}">
+                <a16:creationId xmlns:a16="http://schemas.microsoft.com/office/drawing/2014/main" id="{1C1867C2-6A9A-48DB-A4F9-F5921D8914DC}"/>
+              </a:ext>
+            </a:extLst>
+          </p:cNvPr>
+          <p:cNvSpPr>
+            <a:spLocks noGrp="1"/>
+          </p:cNvSpPr>
+          <p:nvPr>
+            <p:ph idx="1"/>
+          </p:nvPr>
+        </p:nvSpPr>
+        <p:spPr>
+          <a:xfrm>
+            <a:off x="4815349" y="2743200"/>
+            <a:ext cx="3841955" cy="3206080"/>
+          </a:xfrm>
+        </p:spPr>
+        <p:txBody>
+          <a:bodyPr anchor="t">
+            <a:normAutofit/>
+          </a:bodyPr>
+          <a:lstStyle/>
+          <a:p>
+            <a:pPr>
+              <a:lnSpc>
+                <a:spcPct val="90000"/>
+              </a:lnSpc>
+              <a:buFont typeface="Arial" panose="020B0604020202020204" pitchFamily="34" charset="0"/>
+              <a:buChar char="•"/>
+            </a:pPr>
+            <a:r>
+              <a:rPr lang="en-US" sz="1600" dirty="0"/>
+              <a:t>The heartbeat TLS subprotocol (code 24) allows to check if the secure connection between client and server is still active.</a:t>
+            </a:r>
+          </a:p>
+          <a:p>
+            <a:pPr>
+              <a:lnSpc>
+                <a:spcPct val="90000"/>
+              </a:lnSpc>
+              <a:buFont typeface="Arial" panose="020B0604020202020204" pitchFamily="34" charset="0"/>
+              <a:buChar char="•"/>
+            </a:pPr>
+            <a:r>
+              <a:rPr lang="en-US" sz="1600" dirty="0"/>
+              <a:t>It is a kind of TLS-level ping</a:t>
+            </a:r>
+          </a:p>
+          <a:p>
+            <a:pPr>
+              <a:lnSpc>
+                <a:spcPct val="90000"/>
+              </a:lnSpc>
+              <a:buFont typeface="Arial" panose="020B0604020202020204" pitchFamily="34" charset="0"/>
+              <a:buChar char="•"/>
+            </a:pPr>
+            <a:r>
+              <a:rPr lang="en-US" sz="1600" dirty="0"/>
+              <a:t>The client sends a heartbeat request containing a text and its length.</a:t>
+            </a:r>
+          </a:p>
+          <a:p>
+            <a:pPr>
+              <a:lnSpc>
+                <a:spcPct val="90000"/>
+              </a:lnSpc>
+              <a:buFont typeface="Arial" panose="020B0604020202020204" pitchFamily="34" charset="0"/>
+              <a:buChar char="•"/>
+            </a:pPr>
+            <a:r>
+              <a:rPr lang="en-US" sz="1600" dirty="0"/>
+              <a:t>The server should reply with an echo, containing the same message received from the client.</a:t>
+            </a:r>
+            <a:endParaRPr lang="it-IT" sz="1600" dirty="0"/>
+          </a:p>
+        </p:txBody>
+      </p:sp>
+      <p:pic>
+        <p:nvPicPr>
+          <p:cNvPr id="5" name="Immagine 4">
+            <a:extLst>
+              <a:ext uri="{FF2B5EF4-FFF2-40B4-BE49-F238E27FC236}">
+                <a16:creationId xmlns:a16="http://schemas.microsoft.com/office/drawing/2014/main" id="{31CC3C7B-F6F8-4AE0-B30D-FBBC6F285C22}"/>
+              </a:ext>
+            </a:extLst>
+          </p:cNvPr>
+          <p:cNvPicPr>
+            <a:picLocks noChangeAspect="1"/>
+          </p:cNvPicPr>
+          <p:nvPr/>
+        </p:nvPicPr>
+        <p:blipFill rotWithShape="1">
+          <a:blip r:embed="rId2"/>
+          <a:srcRect b="49674"/>
+          <a:stretch/>
+        </p:blipFill>
+        <p:spPr>
+          <a:xfrm>
+            <a:off x="483280" y="2996952"/>
+            <a:ext cx="4088720" cy="2057689"/>
+          </a:xfrm>
+          <a:prstGeom prst="roundRect">
+            <a:avLst>
+              <a:gd name="adj" fmla="val 3517"/>
+            </a:avLst>
+          </a:prstGeom>
+          <a:ln/>
+        </p:spPr>
+        <p:style>
+          <a:lnRef idx="2">
+            <a:schemeClr val="dk1"/>
+          </a:lnRef>
+          <a:fillRef idx="1">
+            <a:schemeClr val="lt1"/>
+          </a:fillRef>
+          <a:effectRef idx="0">
+            <a:schemeClr val="dk1"/>
+          </a:effectRef>
+          <a:fontRef idx="minor">
+            <a:schemeClr val="dk1"/>
+          </a:fontRef>
+        </p:style>
+      </p:pic>
+      <p:pic>
+        <p:nvPicPr>
+          <p:cNvPr id="7" name="Immagine 6" descr="Immagine che contiene disegnando&#10;&#10;Descrizione generata automaticamente">
+            <a:extLst>
+              <a:ext uri="{FF2B5EF4-FFF2-40B4-BE49-F238E27FC236}">
+                <a16:creationId xmlns:a16="http://schemas.microsoft.com/office/drawing/2014/main" id="{2B1542CE-DD77-4D5A-A3EA-294DAAD30ED8}"/>
+              </a:ext>
+            </a:extLst>
+          </p:cNvPr>
+          <p:cNvPicPr>
+            <a:picLocks noChangeAspect="1"/>
+          </p:cNvPicPr>
+          <p:nvPr/>
+        </p:nvPicPr>
+        <p:blipFill>
+          <a:blip r:embed="rId3"/>
+          <a:stretch>
+            <a:fillRect/>
+          </a:stretch>
+        </p:blipFill>
+        <p:spPr>
+          <a:xfrm>
+            <a:off x="2061743" y="1443659"/>
+            <a:ext cx="931793" cy="931793"/>
+          </a:xfrm>
+          <a:prstGeom prst="rect">
+            <a:avLst/>
+          </a:prstGeom>
+          <a:effectLst>
+            <a:softEdge rad="0"/>
+          </a:effectLst>
+        </p:spPr>
+      </p:pic>
+      <p:sp>
+        <p:nvSpPr>
+          <p:cNvPr id="6" name="Titolo 1">
+            <a:extLst>
+              <a:ext uri="{FF2B5EF4-FFF2-40B4-BE49-F238E27FC236}">
+                <a16:creationId xmlns:a16="http://schemas.microsoft.com/office/drawing/2014/main" id="{34C4FB6C-243A-4C5F-AB95-0E5F87803F3D}"/>
+              </a:ext>
+            </a:extLst>
+          </p:cNvPr>
+          <p:cNvSpPr txBox="1">
+            <a:spLocks/>
+          </p:cNvSpPr>
+          <p:nvPr/>
+        </p:nvSpPr>
+        <p:spPr>
+          <a:xfrm>
+            <a:off x="-468560" y="107784"/>
+            <a:ext cx="3841955" cy="1428750"/>
+          </a:xfrm>
+          <a:prstGeom prst="rect">
+            <a:avLst/>
+          </a:prstGeom>
+        </p:spPr>
+        <p:txBody>
+          <a:bodyPr vert="horz" anchor="ctr">
+            <a:normAutofit/>
+          </a:bodyPr>
+          <a:lstStyle>
+            <a:lvl1pPr algn="l" rtl="0" eaLnBrk="0" fontAlgn="base" hangingPunct="0">
+              <a:spcBef>
+                <a:spcPct val="0"/>
+              </a:spcBef>
+              <a:spcAft>
+                <a:spcPct val="0"/>
+              </a:spcAft>
+              <a:defRPr sz="3600" kern="1200" cap="all">
+                <a:solidFill>
+                  <a:schemeClr val="tx2"/>
+                </a:solidFill>
+                <a:effectLst>
+                  <a:reflection blurRad="12700" stA="48000" endA="300" endPos="55000" dir="5400000" sy="-90000" algn="bl" rotWithShape="0"/>
+                </a:effectLst>
+                <a:latin typeface="+mj-lt"/>
+                <a:ea typeface="+mj-ea"/>
+                <a:cs typeface="+mj-cs"/>
+              </a:defRPr>
+            </a:lvl1pPr>
+            <a:lvl2pPr algn="l" rtl="0" eaLnBrk="0" fontAlgn="base" hangingPunct="0">
+              <a:spcBef>
+                <a:spcPct val="0"/>
+              </a:spcBef>
+              <a:spcAft>
+                <a:spcPct val="0"/>
+              </a:spcAft>
+              <a:defRPr sz="3600">
+                <a:solidFill>
+                  <a:schemeClr val="tx2"/>
+                </a:solidFill>
+                <a:latin typeface="Franklin Gothic Medium" pitchFamily="34" charset="0"/>
+              </a:defRPr>
+            </a:lvl2pPr>
+            <a:lvl3pPr algn="l" rtl="0" eaLnBrk="0" fontAlgn="base" hangingPunct="0">
+              <a:spcBef>
+                <a:spcPct val="0"/>
+              </a:spcBef>
+              <a:spcAft>
+                <a:spcPct val="0"/>
+              </a:spcAft>
+              <a:defRPr sz="3600">
+                <a:solidFill>
+                  <a:schemeClr val="tx2"/>
+                </a:solidFill>
+                <a:latin typeface="Franklin Gothic Medium" pitchFamily="34" charset="0"/>
+              </a:defRPr>
+            </a:lvl3pPr>
+            <a:lvl4pPr algn="l" rtl="0" eaLnBrk="0" fontAlgn="base" hangingPunct="0">
+              <a:spcBef>
+                <a:spcPct val="0"/>
+              </a:spcBef>
+              <a:spcAft>
+                <a:spcPct val="0"/>
+              </a:spcAft>
+              <a:defRPr sz="3600">
+                <a:solidFill>
+                  <a:schemeClr val="tx2"/>
+                </a:solidFill>
+                <a:latin typeface="Franklin Gothic Medium" pitchFamily="34" charset="0"/>
+              </a:defRPr>
+            </a:lvl4pPr>
+            <a:lvl5pPr algn="l" rtl="0" eaLnBrk="0" fontAlgn="base" hangingPunct="0">
+              <a:spcBef>
+                <a:spcPct val="0"/>
+              </a:spcBef>
+              <a:spcAft>
+                <a:spcPct val="0"/>
+              </a:spcAft>
+              <a:defRPr sz="3600">
+                <a:solidFill>
+                  <a:schemeClr val="tx2"/>
+                </a:solidFill>
+                <a:latin typeface="Franklin Gothic Medium" pitchFamily="34" charset="0"/>
+              </a:defRPr>
+            </a:lvl5pPr>
+            <a:lvl6pPr marL="457200" algn="l" rtl="0" fontAlgn="base">
+              <a:spcBef>
+                <a:spcPct val="0"/>
+              </a:spcBef>
+              <a:spcAft>
+                <a:spcPct val="0"/>
+              </a:spcAft>
+              <a:defRPr sz="3600">
+                <a:solidFill>
+                  <a:schemeClr val="tx2"/>
+                </a:solidFill>
+                <a:latin typeface="Franklin Gothic Medium" pitchFamily="34" charset="0"/>
+              </a:defRPr>
+            </a:lvl6pPr>
+            <a:lvl7pPr marL="914400" algn="l" rtl="0" fontAlgn="base">
+              <a:spcBef>
+                <a:spcPct val="0"/>
+              </a:spcBef>
+              <a:spcAft>
+                <a:spcPct val="0"/>
+              </a:spcAft>
+              <a:defRPr sz="3600">
+                <a:solidFill>
+                  <a:schemeClr val="tx2"/>
+                </a:solidFill>
+                <a:latin typeface="Franklin Gothic Medium" pitchFamily="34" charset="0"/>
+              </a:defRPr>
+            </a:lvl7pPr>
+            <a:lvl8pPr marL="1371600" algn="l" rtl="0" fontAlgn="base">
+              <a:spcBef>
+                <a:spcPct val="0"/>
+              </a:spcBef>
+              <a:spcAft>
+                <a:spcPct val="0"/>
+              </a:spcAft>
+              <a:defRPr sz="3600">
+                <a:solidFill>
+                  <a:schemeClr val="tx2"/>
+                </a:solidFill>
+                <a:latin typeface="Franklin Gothic Medium" pitchFamily="34" charset="0"/>
+              </a:defRPr>
+            </a:lvl8pPr>
+            <a:lvl9pPr marL="1828800" algn="l" rtl="0" fontAlgn="base">
+              <a:spcBef>
+                <a:spcPct val="0"/>
+              </a:spcBef>
+              <a:spcAft>
+                <a:spcPct val="0"/>
+              </a:spcAft>
+              <a:defRPr sz="3600">
+                <a:solidFill>
+                  <a:schemeClr val="tx2"/>
+                </a:solidFill>
+                <a:latin typeface="Franklin Gothic Medium" pitchFamily="34" charset="0"/>
+              </a:defRPr>
+            </a:lvl9pPr>
+          </a:lstStyle>
+          <a:p>
+            <a:pPr algn="ctr"/>
+            <a:r>
+              <a:rPr lang="it-IT" sz="2400" dirty="0" err="1"/>
+              <a:t>heartBLEED</a:t>
+            </a:r>
+            <a:endParaRPr lang="it-IT" dirty="0"/>
+          </a:p>
+        </p:txBody>
+      </p:sp>
+    </p:spTree>
+    <p:extLst>
+      <p:ext uri="{BB962C8B-B14F-4D97-AF65-F5344CB8AC3E}">
+        <p14:creationId xmlns:p14="http://schemas.microsoft.com/office/powerpoint/2010/main" val="3126708920"/>
+      </p:ext>
+    </p:extLst>
+  </p:cSld>
+  <p:clrMapOvr>
+    <a:masterClrMapping/>
+  </p:clrMapOvr>
+</p:sld>
+</file>
+
+<file path=ppt/slides/slide13.xml><?xml version="1.0" encoding="utf-8"?>
+<p:sld xmlns:a="http://schemas.openxmlformats.org/drawingml/2006/main" xmlns:r="http://schemas.openxmlformats.org/officeDocument/2006/relationships" xmlns:p="http://schemas.openxmlformats.org/presentationml/2006/main">
+  <p:cSld>
+    <p:spTree>
+      <p:nvGrpSpPr>
+        <p:cNvPr id="1" name=""/>
+        <p:cNvGrpSpPr/>
+        <p:nvPr/>
+      </p:nvGrpSpPr>
+      <p:grpSpPr>
+        <a:xfrm>
+          <a:off x="0" y="0"/>
+          <a:ext cx="0" cy="0"/>
+          <a:chOff x="0" y="0"/>
+          <a:chExt cx="0" cy="0"/>
+        </a:xfrm>
+      </p:grpSpPr>
+      <p:sp>
+        <p:nvSpPr>
+          <p:cNvPr id="2" name="Titolo 1">
+            <a:extLst>
+              <a:ext uri="{FF2B5EF4-FFF2-40B4-BE49-F238E27FC236}">
+                <a16:creationId xmlns:a16="http://schemas.microsoft.com/office/drawing/2014/main" id="{09314F0C-D605-4628-8263-4E9847D318A6}"/>
+              </a:ext>
+            </a:extLst>
+          </p:cNvPr>
+          <p:cNvSpPr>
+            <a:spLocks noGrp="1"/>
+          </p:cNvSpPr>
+          <p:nvPr>
+            <p:ph type="title"/>
+          </p:nvPr>
+        </p:nvSpPr>
+        <p:spPr>
+          <a:xfrm>
+            <a:off x="0" y="134325"/>
+            <a:ext cx="9144000" cy="1428750"/>
+          </a:xfrm>
+        </p:spPr>
+        <p:txBody>
+          <a:bodyPr vert="horz" lIns="68580" tIns="34290" rIns="68580" bIns="34290" rtlCol="0" anchor="ctr">
+            <a:normAutofit/>
+          </a:bodyPr>
+          <a:lstStyle/>
+          <a:p>
+            <a:pPr algn="ctr"/>
+            <a:r>
+              <a:rPr lang="en-US" dirty="0"/>
+              <a:t>HEARTBLEED bug ON </a:t>
+            </a:r>
+            <a:r>
+              <a:rPr lang="en-US" dirty="0" err="1"/>
+              <a:t>openSSL</a:t>
+            </a:r>
+            <a:r>
+              <a:rPr lang="en-US" dirty="0"/>
+              <a:t> 1.0.1e</a:t>
+            </a:r>
+          </a:p>
+        </p:txBody>
+      </p:sp>
+      <p:sp>
+        <p:nvSpPr>
+          <p:cNvPr id="7" name="Segnaposto contenuto 2">
+            <a:extLst>
+              <a:ext uri="{FF2B5EF4-FFF2-40B4-BE49-F238E27FC236}">
+                <a16:creationId xmlns:a16="http://schemas.microsoft.com/office/drawing/2014/main" id="{101385F9-B931-4439-8458-F2A3CBEE1F31}"/>
+              </a:ext>
+            </a:extLst>
+          </p:cNvPr>
+          <p:cNvSpPr txBox="1">
+            <a:spLocks/>
+          </p:cNvSpPr>
+          <p:nvPr/>
+        </p:nvSpPr>
+        <p:spPr>
+          <a:xfrm>
+            <a:off x="293362" y="2204864"/>
+            <a:ext cx="3905729" cy="2757305"/>
+          </a:xfrm>
+          <a:prstGeom prst="rect">
+            <a:avLst/>
+          </a:prstGeom>
+        </p:spPr>
+        <p:txBody>
+          <a:bodyPr vert="horz" lIns="68580" tIns="34290" rIns="68580" bIns="34290" rtlCol="0" anchor="t">
+            <a:normAutofit/>
+          </a:bodyPr>
+          <a:lstStyle>
+            <a:lvl1pPr marL="285750" indent="-285750" algn="l" defTabSz="457200" rtl="0" eaLnBrk="1" latinLnBrk="0" hangingPunct="1">
+              <a:spcBef>
+                <a:spcPct val="20000"/>
+              </a:spcBef>
+              <a:spcAft>
+                <a:spcPts val="600"/>
+              </a:spcAft>
+              <a:buClr>
+                <a:schemeClr val="tx1"/>
+              </a:buClr>
+              <a:buSzPct val="100000"/>
+              <a:buFont typeface="Arial"/>
+              <a:buChar char="•"/>
+              <a:defRPr sz="2000" kern="1200" cap="small">
+                <a:gradFill flip="none" rotWithShape="1">
+                  <a:gsLst>
+                    <a:gs pos="0">
+                      <a:schemeClr val="tx1"/>
+                    </a:gs>
+                    <a:gs pos="100000">
+                      <a:schemeClr val="tx1">
+                        <a:lumMod val="75000"/>
+                      </a:schemeClr>
+                    </a:gs>
+                  </a:gsLst>
+                  <a:lin ang="5580000" scaled="0"/>
+                  <a:tileRect/>
+                </a:gradFill>
+                <a:effectLst>
+                  <a:glow rad="38100">
+                    <a:schemeClr val="bg1">
+                      <a:lumMod val="50000"/>
+                      <a:lumOff val="50000"/>
+                      <a:alpha val="20000"/>
+                    </a:schemeClr>
+                  </a:glow>
+                  <a:outerShdw blurRad="44450" dist="12700" dir="13860000" algn="tl" rotWithShape="0">
+                    <a:srgbClr val="000000">
+                      <a:alpha val="20000"/>
+                    </a:srgbClr>
+                  </a:outerShdw>
+                </a:effectLst>
+                <a:latin typeface="+mn-lt"/>
+                <a:ea typeface="+mn-ea"/>
+                <a:cs typeface="+mn-cs"/>
+              </a:defRPr>
+            </a:lvl1pPr>
+            <a:lvl2pPr marL="742950" indent="-285750" algn="l" defTabSz="457200" rtl="0" eaLnBrk="1" latinLnBrk="0" hangingPunct="1">
+              <a:spcBef>
+                <a:spcPct val="20000"/>
+              </a:spcBef>
+              <a:spcAft>
+                <a:spcPts val="600"/>
+              </a:spcAft>
+              <a:buClr>
+                <a:schemeClr val="tx1"/>
+              </a:buClr>
+              <a:buSzPct val="100000"/>
+              <a:buFont typeface="Arial"/>
+              <a:buChar char="•"/>
+              <a:defRPr sz="1800" kern="1200" cap="small">
+                <a:gradFill flip="none" rotWithShape="1">
+                  <a:gsLst>
+                    <a:gs pos="0">
+                      <a:schemeClr val="tx1"/>
+                    </a:gs>
+                    <a:gs pos="100000">
+                      <a:schemeClr val="tx1">
+                        <a:lumMod val="75000"/>
+                      </a:schemeClr>
+                    </a:gs>
+                  </a:gsLst>
+                  <a:lin ang="5580000" scaled="0"/>
+                  <a:tileRect/>
+                </a:gradFill>
+                <a:effectLst>
+                  <a:glow rad="38100">
+                    <a:schemeClr val="bg1">
+                      <a:lumMod val="50000"/>
+                      <a:lumOff val="50000"/>
+                      <a:alpha val="20000"/>
+                    </a:schemeClr>
+                  </a:glow>
+                  <a:outerShdw blurRad="44450" dist="12700" dir="13860000" algn="tl" rotWithShape="0">
+                    <a:srgbClr val="000000">
+                      <a:alpha val="20000"/>
+                    </a:srgbClr>
+                  </a:outerShdw>
+                </a:effectLst>
+                <a:latin typeface="+mn-lt"/>
+                <a:ea typeface="+mn-ea"/>
+                <a:cs typeface="+mn-cs"/>
+              </a:defRPr>
+            </a:lvl2pPr>
+            <a:lvl3pPr marL="1200150" indent="-285750" algn="l" defTabSz="457200" rtl="0" eaLnBrk="1" latinLnBrk="0" hangingPunct="1">
+              <a:spcBef>
+                <a:spcPct val="20000"/>
+              </a:spcBef>
+              <a:spcAft>
+                <a:spcPts val="600"/>
+              </a:spcAft>
+              <a:buClr>
+                <a:schemeClr val="tx1"/>
+              </a:buClr>
+              <a:buSzPct val="100000"/>
+              <a:buFont typeface="Arial"/>
+              <a:buChar char="•"/>
+              <a:defRPr sz="1600" kern="1200" cap="small">
+                <a:gradFill flip="none" rotWithShape="1">
+                  <a:gsLst>
+                    <a:gs pos="0">
+                      <a:schemeClr val="tx1"/>
+                    </a:gs>
+                    <a:gs pos="100000">
+                      <a:schemeClr val="tx1">
+                        <a:lumMod val="75000"/>
+                      </a:schemeClr>
+                    </a:gs>
+                  </a:gsLst>
+                  <a:lin ang="5580000" scaled="0"/>
+                  <a:tileRect/>
+                </a:gradFill>
+                <a:effectLst>
+                  <a:glow rad="38100">
+                    <a:schemeClr val="bg1">
+                      <a:lumMod val="50000"/>
+                      <a:lumOff val="50000"/>
+                      <a:alpha val="20000"/>
+                    </a:schemeClr>
+                  </a:glow>
+                  <a:outerShdw blurRad="44450" dist="12700" dir="13860000" algn="tl" rotWithShape="0">
+                    <a:srgbClr val="000000">
+                      <a:alpha val="20000"/>
+                    </a:srgbClr>
+                  </a:outerShdw>
+                </a:effectLst>
+                <a:latin typeface="+mn-lt"/>
+                <a:ea typeface="+mn-ea"/>
+                <a:cs typeface="+mn-cs"/>
+              </a:defRPr>
+            </a:lvl3pPr>
+            <a:lvl4pPr marL="1543050" indent="-171450" algn="l" defTabSz="457200" rtl="0" eaLnBrk="1" latinLnBrk="0" hangingPunct="1">
+              <a:spcBef>
+                <a:spcPct val="20000"/>
+              </a:spcBef>
+              <a:spcAft>
+                <a:spcPts val="600"/>
+              </a:spcAft>
+              <a:buClr>
+                <a:schemeClr val="tx1"/>
+              </a:buClr>
+              <a:buSzPct val="100000"/>
+              <a:buFont typeface="Arial"/>
+              <a:buChar char="•"/>
+              <a:defRPr sz="1400" kern="1200" cap="small">
+                <a:gradFill flip="none" rotWithShape="1">
+                  <a:gsLst>
+                    <a:gs pos="0">
+                      <a:schemeClr val="tx1"/>
+                    </a:gs>
+                    <a:gs pos="100000">
+                      <a:schemeClr val="tx1">
+                        <a:lumMod val="75000"/>
+                      </a:schemeClr>
+                    </a:gs>
+                  </a:gsLst>
+                  <a:lin ang="5580000" scaled="0"/>
+                  <a:tileRect/>
+                </a:gradFill>
+                <a:effectLst>
+                  <a:glow rad="38100">
+                    <a:schemeClr val="bg1">
+                      <a:lumMod val="50000"/>
+                      <a:lumOff val="50000"/>
+                      <a:alpha val="20000"/>
+                    </a:schemeClr>
+                  </a:glow>
+                  <a:outerShdw blurRad="44450" dist="12700" dir="13860000" algn="tl" rotWithShape="0">
+                    <a:srgbClr val="000000">
+                      <a:alpha val="20000"/>
+                    </a:srgbClr>
+                  </a:outerShdw>
+                </a:effectLst>
+                <a:latin typeface="+mn-lt"/>
+                <a:ea typeface="+mn-ea"/>
+                <a:cs typeface="+mn-cs"/>
+              </a:defRPr>
+            </a:lvl4pPr>
+            <a:lvl5pPr marL="2000250" indent="-171450" algn="l" defTabSz="457200" rtl="0" eaLnBrk="1" latinLnBrk="0" hangingPunct="1">
+              <a:spcBef>
+                <a:spcPct val="20000"/>
+              </a:spcBef>
+              <a:spcAft>
+                <a:spcPts val="600"/>
+              </a:spcAft>
+              <a:buClr>
+                <a:schemeClr val="tx1"/>
+              </a:buClr>
+              <a:buSzPct val="100000"/>
+              <a:buFont typeface="Arial"/>
+              <a:buChar char="•"/>
+              <a:defRPr sz="1400" kern="1200" cap="small">
+                <a:gradFill flip="none" rotWithShape="1">
+                  <a:gsLst>
+                    <a:gs pos="0">
+                      <a:schemeClr val="tx1"/>
+                    </a:gs>
+                    <a:gs pos="100000">
+                      <a:schemeClr val="tx1">
+                        <a:lumMod val="75000"/>
+                      </a:schemeClr>
+                    </a:gs>
+                  </a:gsLst>
+                  <a:lin ang="5580000" scaled="0"/>
+                  <a:tileRect/>
+                </a:gradFill>
+                <a:effectLst>
+                  <a:glow rad="38100">
+                    <a:schemeClr val="bg1">
+                      <a:lumMod val="50000"/>
+                      <a:lumOff val="50000"/>
+                      <a:alpha val="20000"/>
+                    </a:schemeClr>
+                  </a:glow>
+                  <a:outerShdw blurRad="44450" dist="12700" dir="13860000" algn="tl" rotWithShape="0">
+                    <a:srgbClr val="000000">
+                      <a:alpha val="20000"/>
+                    </a:srgbClr>
+                  </a:outerShdw>
+                </a:effectLst>
+                <a:latin typeface="+mn-lt"/>
+                <a:ea typeface="+mn-ea"/>
+                <a:cs typeface="+mn-cs"/>
+              </a:defRPr>
+            </a:lvl5pPr>
+            <a:lvl6pPr marL="2514600" indent="-228600" algn="l" defTabSz="457200" rtl="0" eaLnBrk="1" latinLnBrk="0" hangingPunct="1">
+              <a:spcBef>
+                <a:spcPct val="20000"/>
+              </a:spcBef>
+              <a:spcAft>
+                <a:spcPts val="600"/>
+              </a:spcAft>
+              <a:buClr>
+                <a:schemeClr val="tx1"/>
+              </a:buClr>
+              <a:buSzPct val="100000"/>
+              <a:buFont typeface="Arial"/>
+              <a:buChar char="•"/>
+              <a:defRPr sz="1200" kern="1200" cap="small">
+                <a:gradFill flip="none" rotWithShape="1">
+                  <a:gsLst>
+                    <a:gs pos="0">
+                      <a:schemeClr val="tx1"/>
+                    </a:gs>
+                    <a:gs pos="100000">
+                      <a:schemeClr val="tx1">
+                        <a:lumMod val="75000"/>
+                      </a:schemeClr>
+                    </a:gs>
+                  </a:gsLst>
+                  <a:lin ang="5580000" scaled="0"/>
+                  <a:tileRect/>
+                </a:gradFill>
+                <a:effectLst>
+                  <a:glow rad="38100">
+                    <a:schemeClr val="bg1">
+                      <a:lumMod val="50000"/>
+                      <a:lumOff val="50000"/>
+                      <a:alpha val="20000"/>
+                    </a:schemeClr>
+                  </a:glow>
+                  <a:outerShdw blurRad="44450" dist="12700" dir="13860000" algn="tl" rotWithShape="0">
+                    <a:srgbClr val="000000">
+                      <a:alpha val="20000"/>
+                    </a:srgbClr>
+                  </a:outerShdw>
+                </a:effectLst>
+                <a:latin typeface="+mn-lt"/>
+                <a:ea typeface="+mn-ea"/>
+                <a:cs typeface="+mn-cs"/>
+              </a:defRPr>
+            </a:lvl6pPr>
+            <a:lvl7pPr marL="2971800" indent="-228600" algn="l" defTabSz="457200" rtl="0" eaLnBrk="1" latinLnBrk="0" hangingPunct="1">
+              <a:spcBef>
+                <a:spcPct val="20000"/>
+              </a:spcBef>
+              <a:spcAft>
+                <a:spcPts val="600"/>
+              </a:spcAft>
+              <a:buClr>
+                <a:schemeClr val="tx1"/>
+              </a:buClr>
+              <a:buSzPct val="100000"/>
+              <a:buFont typeface="Arial"/>
+              <a:buChar char="•"/>
+              <a:defRPr sz="1200" kern="1200" cap="small">
+                <a:gradFill flip="none" rotWithShape="1">
+                  <a:gsLst>
+                    <a:gs pos="0">
+                      <a:schemeClr val="tx1"/>
+                    </a:gs>
+                    <a:gs pos="100000">
+                      <a:schemeClr val="tx1">
+                        <a:lumMod val="75000"/>
+                      </a:schemeClr>
+                    </a:gs>
+                  </a:gsLst>
+                  <a:lin ang="5580000" scaled="0"/>
+                  <a:tileRect/>
+                </a:gradFill>
+                <a:effectLst>
+                  <a:glow rad="38100">
+                    <a:schemeClr val="bg1">
+                      <a:lumMod val="50000"/>
+                      <a:lumOff val="50000"/>
+                      <a:alpha val="20000"/>
+                    </a:schemeClr>
+                  </a:glow>
+                  <a:outerShdw blurRad="44450" dist="12700" dir="13860000" algn="tl" rotWithShape="0">
+                    <a:srgbClr val="000000">
+                      <a:alpha val="20000"/>
+                    </a:srgbClr>
+                  </a:outerShdw>
+                </a:effectLst>
+                <a:latin typeface="+mn-lt"/>
+                <a:ea typeface="+mn-ea"/>
+                <a:cs typeface="+mn-cs"/>
+              </a:defRPr>
+            </a:lvl7pPr>
+            <a:lvl8pPr marL="3429000" indent="-228600" algn="l" defTabSz="457200" rtl="0" eaLnBrk="1" latinLnBrk="0" hangingPunct="1">
+              <a:spcBef>
+                <a:spcPct val="20000"/>
+              </a:spcBef>
+              <a:spcAft>
+                <a:spcPts val="600"/>
+              </a:spcAft>
+              <a:buClr>
+                <a:schemeClr val="tx1"/>
+              </a:buClr>
+              <a:buSzPct val="100000"/>
+              <a:buFont typeface="Arial"/>
+              <a:buChar char="•"/>
+              <a:defRPr sz="1200" kern="1200" cap="small">
+                <a:gradFill flip="none" rotWithShape="1">
+                  <a:gsLst>
+                    <a:gs pos="0">
+                      <a:schemeClr val="tx1"/>
+                    </a:gs>
+                    <a:gs pos="100000">
+                      <a:schemeClr val="tx1">
+                        <a:lumMod val="75000"/>
+                      </a:schemeClr>
+                    </a:gs>
+                  </a:gsLst>
+                  <a:lin ang="5580000" scaled="0"/>
+                  <a:tileRect/>
+                </a:gradFill>
+                <a:effectLst>
+                  <a:glow rad="38100">
+                    <a:schemeClr val="bg1">
+                      <a:lumMod val="50000"/>
+                      <a:lumOff val="50000"/>
+                      <a:alpha val="20000"/>
+                    </a:schemeClr>
+                  </a:glow>
+                  <a:outerShdw blurRad="44450" dist="12700" dir="13860000" algn="tl" rotWithShape="0">
+                    <a:srgbClr val="000000">
+                      <a:alpha val="20000"/>
+                    </a:srgbClr>
+                  </a:outerShdw>
+                </a:effectLst>
+                <a:latin typeface="+mn-lt"/>
+                <a:ea typeface="+mn-ea"/>
+                <a:cs typeface="+mn-cs"/>
+              </a:defRPr>
+            </a:lvl8pPr>
+            <a:lvl9pPr marL="3886200" indent="-228600" algn="l" defTabSz="457200" rtl="0" eaLnBrk="1" latinLnBrk="0" hangingPunct="1">
+              <a:spcBef>
+                <a:spcPct val="20000"/>
+              </a:spcBef>
+              <a:spcAft>
+                <a:spcPts val="600"/>
+              </a:spcAft>
+              <a:buClr>
+                <a:schemeClr val="tx1"/>
+              </a:buClr>
+              <a:buSzPct val="100000"/>
+              <a:buFont typeface="Arial"/>
+              <a:buChar char="•"/>
+              <a:defRPr sz="1200" kern="1200" cap="small">
+                <a:gradFill flip="none" rotWithShape="1">
+                  <a:gsLst>
+                    <a:gs pos="0">
+                      <a:schemeClr val="tx1"/>
+                    </a:gs>
+                    <a:gs pos="100000">
+                      <a:schemeClr val="tx1">
+                        <a:lumMod val="75000"/>
+                      </a:schemeClr>
+                    </a:gs>
+                  </a:gsLst>
+                  <a:lin ang="5580000" scaled="0"/>
+                  <a:tileRect/>
+                </a:gradFill>
+                <a:effectLst>
+                  <a:glow rad="38100">
+                    <a:schemeClr val="bg1">
+                      <a:lumMod val="50000"/>
+                      <a:lumOff val="50000"/>
+                      <a:alpha val="20000"/>
+                    </a:schemeClr>
+                  </a:glow>
+                  <a:outerShdw blurRad="44450" dist="12700" dir="13860000" algn="tl" rotWithShape="0">
+                    <a:srgbClr val="000000">
+                      <a:alpha val="20000"/>
+                    </a:srgbClr>
+                  </a:outerShdw>
+                </a:effectLst>
+                <a:latin typeface="+mn-lt"/>
+                <a:ea typeface="+mn-ea"/>
+                <a:cs typeface="+mn-cs"/>
+              </a:defRPr>
+            </a:lvl9pPr>
+          </a:lstStyle>
+          <a:p>
+            <a:pPr marL="0" indent="0">
+              <a:lnSpc>
+                <a:spcPct val="90000"/>
+              </a:lnSpc>
+              <a:buNone/>
+            </a:pPr>
+            <a:endParaRPr lang="en-US" sz="1200" dirty="0"/>
+          </a:p>
+          <a:p>
+            <a:pPr>
+              <a:lnSpc>
+                <a:spcPct val="90000"/>
+              </a:lnSpc>
+            </a:pPr>
+            <a:r>
+              <a:rPr lang="en-US" sz="1200" dirty="0"/>
+              <a:t>The bug was caused by not checking the size of the sent message.</a:t>
+            </a:r>
+          </a:p>
+          <a:p>
+            <a:pPr>
+              <a:lnSpc>
+                <a:spcPct val="90000"/>
+              </a:lnSpc>
+            </a:pPr>
+            <a:r>
+              <a:rPr lang="en-US" sz="1200" dirty="0"/>
+              <a:t>If a message with a size greater than the real one is requested, the client's message and all the data of the adjacent memory cells will be returned until the requested size is reached.</a:t>
+            </a:r>
+          </a:p>
+          <a:p>
+            <a:pPr>
+              <a:lnSpc>
+                <a:spcPct val="90000"/>
+              </a:lnSpc>
+            </a:pPr>
+            <a:r>
+              <a:rPr lang="en-US" sz="1200" dirty="0"/>
+              <a:t>In this way sensitive data could be COLLECTED in clear text.</a:t>
+            </a:r>
+          </a:p>
+          <a:p>
+            <a:pPr>
+              <a:lnSpc>
+                <a:spcPct val="90000"/>
+              </a:lnSpc>
+            </a:pPr>
+            <a:r>
+              <a:rPr lang="en-US" sz="1200" dirty="0"/>
+              <a:t>HOWEVER, Although an attacker has good control over the size of the exposed memory block, he has no control over its location, and therefore cannot choose what content will be revealed.</a:t>
+            </a:r>
+          </a:p>
+        </p:txBody>
+      </p:sp>
+      <p:pic>
+        <p:nvPicPr>
+          <p:cNvPr id="6" name="Segnaposto contenuto 5">
+            <a:extLst>
+              <a:ext uri="{FF2B5EF4-FFF2-40B4-BE49-F238E27FC236}">
+                <a16:creationId xmlns:a16="http://schemas.microsoft.com/office/drawing/2014/main" id="{69881924-3ED0-4365-9946-EAD857EC1ED0}"/>
+              </a:ext>
+            </a:extLst>
+          </p:cNvPr>
+          <p:cNvPicPr>
+            <a:picLocks noGrp="1" noChangeAspect="1"/>
+          </p:cNvPicPr>
+          <p:nvPr>
+            <p:ph idx="1"/>
+          </p:nvPr>
+        </p:nvPicPr>
+        <p:blipFill rotWithShape="1">
+          <a:blip r:embed="rId2"/>
+          <a:srcRect t="48887"/>
+          <a:stretch/>
+        </p:blipFill>
+        <p:spPr>
+          <a:xfrm>
+            <a:off x="4388123" y="2494575"/>
+            <a:ext cx="4087800" cy="2089398"/>
+          </a:xfrm>
+          <a:prstGeom prst="roundRect">
+            <a:avLst>
+              <a:gd name="adj" fmla="val 3517"/>
+            </a:avLst>
+          </a:prstGeom>
+          <a:ln/>
+        </p:spPr>
+        <p:style>
+          <a:lnRef idx="2">
+            <a:schemeClr val="dk1"/>
+          </a:lnRef>
+          <a:fillRef idx="1">
+            <a:schemeClr val="lt1"/>
+          </a:fillRef>
+          <a:effectRef idx="0">
+            <a:schemeClr val="dk1"/>
+          </a:effectRef>
+          <a:fontRef idx="minor">
+            <a:schemeClr val="dk1"/>
+          </a:fontRef>
+        </p:style>
+      </p:pic>
+      <p:pic>
+        <p:nvPicPr>
+          <p:cNvPr id="11" name="Immagine 10" descr="Immagine che contiene disegnando&#10;&#10;Descrizione generata automaticamente">
+            <a:extLst>
+              <a:ext uri="{FF2B5EF4-FFF2-40B4-BE49-F238E27FC236}">
+                <a16:creationId xmlns:a16="http://schemas.microsoft.com/office/drawing/2014/main" id="{6757AA71-1A8E-437A-BA29-74E55BD667C9}"/>
+              </a:ext>
+            </a:extLst>
+          </p:cNvPr>
+          <p:cNvPicPr>
+            <a:picLocks noChangeAspect="1"/>
+          </p:cNvPicPr>
+          <p:nvPr/>
+        </p:nvPicPr>
+        <p:blipFill>
+          <a:blip r:embed="rId3"/>
+          <a:stretch>
+            <a:fillRect/>
+          </a:stretch>
+        </p:blipFill>
+        <p:spPr>
+          <a:xfrm>
+            <a:off x="5966273" y="1563075"/>
+            <a:ext cx="931500" cy="931500"/>
+          </a:xfrm>
+          <a:prstGeom prst="rect">
+            <a:avLst/>
+          </a:prstGeom>
+          <a:effectLst>
+            <a:softEdge rad="25400"/>
+          </a:effectLst>
+        </p:spPr>
+      </p:pic>
+    </p:spTree>
+    <p:extLst>
+      <p:ext uri="{BB962C8B-B14F-4D97-AF65-F5344CB8AC3E}">
+        <p14:creationId xmlns:p14="http://schemas.microsoft.com/office/powerpoint/2010/main" val="859464092"/>
+      </p:ext>
+    </p:extLst>
+  </p:cSld>
+  <p:clrMapOvr>
+    <a:masterClrMapping/>
+  </p:clrMapOvr>
+</p:sld>
+</file>
+
+<file path=ppt/slides/slide14.xml><?xml version="1.0" encoding="utf-8"?>
+<p:sld xmlns:a="http://schemas.openxmlformats.org/drawingml/2006/main" xmlns:r="http://schemas.openxmlformats.org/officeDocument/2006/relationships" xmlns:p="http://schemas.openxmlformats.org/presentationml/2006/main">
+  <p:cSld>
+    <p:spTree>
+      <p:nvGrpSpPr>
+        <p:cNvPr id="1" name=""/>
+        <p:cNvGrpSpPr/>
+        <p:nvPr/>
+      </p:nvGrpSpPr>
+      <p:grpSpPr>
+        <a:xfrm>
+          <a:off x="0" y="0"/>
+          <a:ext cx="0" cy="0"/>
+          <a:chOff x="0" y="0"/>
+          <a:chExt cx="0" cy="0"/>
+        </a:xfrm>
+      </p:grpSpPr>
+      <p:sp>
+        <p:nvSpPr>
           <p:cNvPr id="2" name="Titolo 1"/>
           <p:cNvSpPr>
             <a:spLocks noGrp="1"/>
@@ -11603,7 +12934,7 @@
 </p:sld>
 </file>
 
-<file path=ppt/slides/slide11.xml><?xml version="1.0" encoding="utf-8"?>
+<file path=ppt/slides/slide15.xml><?xml version="1.0" encoding="utf-8"?>
 <p:sld xmlns:a="http://schemas.openxmlformats.org/drawingml/2006/main" xmlns:r="http://schemas.openxmlformats.org/officeDocument/2006/relationships" xmlns:p="http://schemas.openxmlformats.org/presentationml/2006/main">
   <p:cSld>
     <p:spTree>
@@ -11733,7 +13064,7 @@
 </p:sld>
 </file>
 
-<file path=ppt/slides/slide12.xml><?xml version="1.0" encoding="utf-8"?>
+<file path=ppt/slides/slide16.xml><?xml version="1.0" encoding="utf-8"?>
 <p:sld xmlns:a="http://schemas.openxmlformats.org/drawingml/2006/main" xmlns:r="http://schemas.openxmlformats.org/officeDocument/2006/relationships" xmlns:p="http://schemas.openxmlformats.org/presentationml/2006/main">
   <p:cSld>
     <p:spTree>
@@ -11952,7 +13283,7 @@
 </p:sld>
 </file>
 
-<file path=ppt/slides/slide13.xml><?xml version="1.0" encoding="utf-8"?>
+<file path=ppt/slides/slide17.xml><?xml version="1.0" encoding="utf-8"?>
 <p:sld xmlns:a="http://schemas.openxmlformats.org/drawingml/2006/main" xmlns:r="http://schemas.openxmlformats.org/officeDocument/2006/relationships" xmlns:p="http://schemas.openxmlformats.org/presentationml/2006/main">
   <p:cSld>
     <p:spTree>
@@ -12345,7 +13676,7 @@
 </p:sld>
 </file>
 
-<file path=ppt/slides/slide14.xml><?xml version="1.0" encoding="utf-8"?>
+<file path=ppt/slides/slide18.xml><?xml version="1.0" encoding="utf-8"?>
 <p:sld xmlns:a="http://schemas.openxmlformats.org/drawingml/2006/main" xmlns:r="http://schemas.openxmlformats.org/officeDocument/2006/relationships" xmlns:p="http://schemas.openxmlformats.org/presentationml/2006/main">
   <p:cSld>
     <p:spTree>
@@ -12467,7 +13798,7 @@
 </p:sld>
 </file>
 
-<file path=ppt/slides/slide15.xml><?xml version="1.0" encoding="utf-8"?>
+<file path=ppt/slides/slide19.xml><?xml version="1.0" encoding="utf-8"?>
 <p:sld xmlns:a="http://schemas.openxmlformats.org/drawingml/2006/main" xmlns:r="http://schemas.openxmlformats.org/officeDocument/2006/relationships" xmlns:p="http://schemas.openxmlformats.org/presentationml/2006/main">
   <p:cSld>
     <p:spTree>
@@ -12598,7 +13929,293 @@
 </p:sld>
 </file>
 
-<file path=ppt/slides/slide16.xml><?xml version="1.0" encoding="utf-8"?>
+<file path=ppt/slides/slide2.xml><?xml version="1.0" encoding="utf-8"?>
+<p:sld xmlns:a="http://schemas.openxmlformats.org/drawingml/2006/main" xmlns:r="http://schemas.openxmlformats.org/officeDocument/2006/relationships" xmlns:p="http://schemas.openxmlformats.org/presentationml/2006/main">
+  <p:cSld>
+    <p:spTree>
+      <p:nvGrpSpPr>
+        <p:cNvPr id="1" name=""/>
+        <p:cNvGrpSpPr/>
+        <p:nvPr/>
+      </p:nvGrpSpPr>
+      <p:grpSpPr>
+        <a:xfrm>
+          <a:off x="0" y="0"/>
+          <a:ext cx="0" cy="0"/>
+          <a:chOff x="0" y="0"/>
+          <a:chExt cx="0" cy="0"/>
+        </a:xfrm>
+      </p:grpSpPr>
+      <p:sp>
+        <p:nvSpPr>
+          <p:cNvPr id="2" name="Title 1">
+            <a:extLst>
+              <a:ext uri="{FF2B5EF4-FFF2-40B4-BE49-F238E27FC236}">
+                <a16:creationId xmlns:a16="http://schemas.microsoft.com/office/drawing/2014/main" id="{C8470D3D-7DCC-4CE8-B0CF-8E4265691C5B}"/>
+              </a:ext>
+            </a:extLst>
+          </p:cNvPr>
+          <p:cNvSpPr>
+            <a:spLocks noGrp="1"/>
+          </p:cNvSpPr>
+          <p:nvPr>
+            <p:ph type="title"/>
+          </p:nvPr>
+        </p:nvSpPr>
+        <p:spPr/>
+        <p:txBody>
+          <a:bodyPr/>
+          <a:lstStyle/>
+          <a:p>
+            <a:r>
+              <a:rPr lang="en-US" dirty="0"/>
+              <a:t>History &amp; GOALS</a:t>
+            </a:r>
+            <a:endParaRPr lang="it-IT" dirty="0"/>
+          </a:p>
+        </p:txBody>
+      </p:sp>
+      <p:sp>
+        <p:nvSpPr>
+          <p:cNvPr id="3" name="Content Placeholder 2">
+            <a:extLst>
+              <a:ext uri="{FF2B5EF4-FFF2-40B4-BE49-F238E27FC236}">
+                <a16:creationId xmlns:a16="http://schemas.microsoft.com/office/drawing/2014/main" id="{FDAABD4D-DD49-437B-A393-05F43BCEEC68}"/>
+              </a:ext>
+            </a:extLst>
+          </p:cNvPr>
+          <p:cNvSpPr>
+            <a:spLocks noGrp="1"/>
+          </p:cNvSpPr>
+          <p:nvPr>
+            <p:ph idx="1"/>
+          </p:nvPr>
+        </p:nvSpPr>
+        <p:spPr>
+          <a:xfrm>
+            <a:off x="179512" y="1554163"/>
+            <a:ext cx="8812088" cy="4525962"/>
+          </a:xfrm>
+        </p:spPr>
+        <p:txBody>
+          <a:bodyPr/>
+          <a:lstStyle/>
+          <a:p>
+            <a:r>
+              <a:rPr lang="it-IT" sz="2400" dirty="0" err="1"/>
+              <a:t>Since</a:t>
+            </a:r>
+            <a:r>
+              <a:rPr lang="it-IT" sz="2400" dirty="0"/>
+              <a:t> </a:t>
+            </a:r>
+            <a:r>
+              <a:rPr lang="it-IT" sz="2400" dirty="0" err="1"/>
+              <a:t>its</a:t>
+            </a:r>
+            <a:r>
+              <a:rPr lang="it-IT" sz="2400" dirty="0"/>
+              <a:t> </a:t>
+            </a:r>
+            <a:r>
+              <a:rPr lang="it-IT" sz="2400" dirty="0" err="1"/>
+              <a:t>earliest</a:t>
+            </a:r>
+            <a:r>
+              <a:rPr lang="it-IT" sz="2400" dirty="0"/>
+              <a:t> </a:t>
+            </a:r>
+            <a:r>
+              <a:rPr lang="it-IT" sz="2400" dirty="0" err="1"/>
+              <a:t>inception</a:t>
+            </a:r>
+            <a:r>
+              <a:rPr lang="it-IT" sz="2400" dirty="0"/>
+              <a:t> HTTP </a:t>
+            </a:r>
+            <a:r>
+              <a:rPr lang="it-IT" sz="2400" dirty="0" err="1"/>
+              <a:t>inventors</a:t>
+            </a:r>
+            <a:r>
+              <a:rPr lang="it-IT" sz="2400" dirty="0"/>
+              <a:t> </a:t>
+            </a:r>
+            <a:r>
+              <a:rPr lang="it-IT" sz="2400" dirty="0" err="1"/>
+              <a:t>felt</a:t>
+            </a:r>
+            <a:r>
+              <a:rPr lang="it-IT" sz="2400" dirty="0"/>
+              <a:t> the </a:t>
+            </a:r>
+            <a:r>
+              <a:rPr lang="it-IT" sz="2400" dirty="0" err="1"/>
+              <a:t>need</a:t>
+            </a:r>
+            <a:r>
+              <a:rPr lang="it-IT" sz="2400" dirty="0"/>
+              <a:t> of </a:t>
+            </a:r>
+            <a:r>
+              <a:rPr lang="it-IT" sz="2400" dirty="0" err="1"/>
+              <a:t>reassuring</a:t>
+            </a:r>
+            <a:r>
+              <a:rPr lang="it-IT" sz="2400" dirty="0"/>
+              <a:t> users so to </a:t>
+            </a:r>
+            <a:r>
+              <a:rPr lang="it-IT" sz="2400" dirty="0" err="1"/>
+              <a:t>allow</a:t>
+            </a:r>
+            <a:endParaRPr lang="it-IT" sz="2400" dirty="0"/>
+          </a:p>
+          <a:p>
+            <a:pPr lvl="1"/>
+            <a:r>
+              <a:rPr lang="it-IT" sz="2000" dirty="0"/>
+              <a:t>Secure e-commerce, secure banking, etc.</a:t>
+            </a:r>
+          </a:p>
+          <a:p>
+            <a:r>
+              <a:rPr lang="it-IT" sz="2400" dirty="0"/>
+              <a:t>Internet </a:t>
+            </a:r>
+            <a:r>
+              <a:rPr lang="it-IT" sz="2400" dirty="0" err="1"/>
+              <a:t>before</a:t>
+            </a:r>
+            <a:r>
+              <a:rPr lang="it-IT" sz="2400" dirty="0"/>
+              <a:t> SSL </a:t>
+            </a:r>
+            <a:r>
+              <a:rPr lang="it-IT" sz="2400" dirty="0" err="1"/>
+              <a:t>was</a:t>
+            </a:r>
+            <a:r>
+              <a:rPr lang="it-IT" sz="2400" dirty="0"/>
+              <a:t> a wild world</a:t>
+            </a:r>
+          </a:p>
+          <a:p>
+            <a:pPr lvl="1"/>
+            <a:r>
+              <a:rPr lang="it-IT" sz="2000" dirty="0">
+                <a:hlinkClick r:id="rId2"/>
+              </a:rPr>
+              <a:t>https://www.feistyduck.com/ssl-tls-and-pki-history/</a:t>
+            </a:r>
+            <a:endParaRPr lang="it-IT" sz="2000" dirty="0"/>
+          </a:p>
+          <a:p>
+            <a:endParaRPr lang="it-IT" sz="2400" dirty="0"/>
+          </a:p>
+          <a:p>
+            <a:endParaRPr lang="it-IT" sz="2400" dirty="0"/>
+          </a:p>
+          <a:p>
+            <a:endParaRPr lang="it-IT" sz="2400" dirty="0"/>
+          </a:p>
+          <a:p>
+            <a:r>
+              <a:rPr lang="it-IT" sz="2400" dirty="0" err="1"/>
+              <a:t>Add</a:t>
+            </a:r>
+            <a:r>
+              <a:rPr lang="it-IT" sz="2400" dirty="0"/>
+              <a:t> a </a:t>
+            </a:r>
+            <a:r>
+              <a:rPr lang="it-IT" sz="2400" dirty="0" err="1"/>
+              <a:t>safety</a:t>
+            </a:r>
+            <a:r>
+              <a:rPr lang="it-IT" sz="2400" dirty="0"/>
+              <a:t> </a:t>
+            </a:r>
+            <a:r>
+              <a:rPr lang="it-IT" sz="2400" dirty="0" err="1"/>
+              <a:t>layer</a:t>
+            </a:r>
+            <a:r>
+              <a:rPr lang="it-IT" sz="2400" dirty="0"/>
+              <a:t> in-</a:t>
+            </a:r>
+            <a:r>
+              <a:rPr lang="it-IT" sz="2400" dirty="0" err="1"/>
+              <a:t>between</a:t>
+            </a:r>
+            <a:r>
+              <a:rPr lang="it-IT" sz="2400" dirty="0"/>
+              <a:t> Layer 7 and Layer 4 </a:t>
+            </a:r>
+            <a:r>
+              <a:rPr lang="it-IT" sz="2400" dirty="0" err="1"/>
+              <a:t>conversations</a:t>
+            </a:r>
+            <a:endParaRPr lang="it-IT" sz="2400" dirty="0"/>
+          </a:p>
+          <a:p>
+            <a:pPr lvl="1"/>
+            <a:r>
+              <a:rPr lang="it-IT" sz="2000" dirty="0"/>
+              <a:t>Parties can prove </a:t>
+            </a:r>
+            <a:r>
+              <a:rPr lang="it-IT" sz="2000" dirty="0" err="1"/>
+              <a:t>their</a:t>
+            </a:r>
+            <a:r>
+              <a:rPr lang="it-IT" sz="2000" dirty="0"/>
+              <a:t> </a:t>
+            </a:r>
+            <a:r>
+              <a:rPr lang="it-IT" sz="2000" dirty="0" err="1"/>
+              <a:t>identity</a:t>
+            </a:r>
+            <a:endParaRPr lang="it-IT" sz="2000" dirty="0"/>
+          </a:p>
+          <a:p>
+            <a:pPr lvl="1"/>
+            <a:r>
+              <a:rPr lang="it-IT" sz="2000" dirty="0"/>
+              <a:t>Parties can talk </a:t>
+            </a:r>
+            <a:r>
+              <a:rPr lang="it-IT" sz="2000" dirty="0" err="1"/>
+              <a:t>confidentially</a:t>
+            </a:r>
+            <a:endParaRPr lang="it-IT" sz="2000" dirty="0"/>
+          </a:p>
+          <a:p>
+            <a:pPr lvl="1"/>
+            <a:r>
+              <a:rPr lang="it-IT" sz="2000" dirty="0"/>
+              <a:t>Parties can talk with no tampering</a:t>
+            </a:r>
+          </a:p>
+          <a:p>
+            <a:endParaRPr lang="it-IT" sz="2400" dirty="0"/>
+          </a:p>
+        </p:txBody>
+      </p:sp>
+    </p:spTree>
+    <p:extLst>
+      <p:ext uri="{BB962C8B-B14F-4D97-AF65-F5344CB8AC3E}">
+        <p14:creationId xmlns:p14="http://schemas.microsoft.com/office/powerpoint/2010/main" val="2870853085"/>
+      </p:ext>
+    </p:extLst>
+  </p:cSld>
+  <p:clrMapOvr>
+    <a:masterClrMapping/>
+  </p:clrMapOvr>
+</p:sld>
+</file>
+
+<file path=ppt/slides/slide20.xml><?xml version="1.0" encoding="utf-8"?>
 <p:sld xmlns:a="http://schemas.openxmlformats.org/drawingml/2006/main" xmlns:r="http://schemas.openxmlformats.org/officeDocument/2006/relationships" xmlns:p="http://schemas.openxmlformats.org/presentationml/2006/main">
   <p:cSld>
     <p:spTree>
@@ -12738,7 +14355,7 @@
 </p:sld>
 </file>
 
-<file path=ppt/slides/slide17.xml><?xml version="1.0" encoding="utf-8"?>
+<file path=ppt/slides/slide21.xml><?xml version="1.0" encoding="utf-8"?>
 <p:sld xmlns:a="http://schemas.openxmlformats.org/drawingml/2006/main" xmlns:r="http://schemas.openxmlformats.org/officeDocument/2006/relationships" xmlns:p="http://schemas.openxmlformats.org/presentationml/2006/main">
   <p:cSld>
     <p:spTree>
@@ -12856,292 +14473,6 @@
     <p:extLst>
       <p:ext uri="{BB962C8B-B14F-4D97-AF65-F5344CB8AC3E}">
         <p14:creationId xmlns:p14="http://schemas.microsoft.com/office/powerpoint/2010/main" val="3939116378"/>
-      </p:ext>
-    </p:extLst>
-  </p:cSld>
-  <p:clrMapOvr>
-    <a:masterClrMapping/>
-  </p:clrMapOvr>
-</p:sld>
-</file>
-
-<file path=ppt/slides/slide2.xml><?xml version="1.0" encoding="utf-8"?>
-<p:sld xmlns:a="http://schemas.openxmlformats.org/drawingml/2006/main" xmlns:r="http://schemas.openxmlformats.org/officeDocument/2006/relationships" xmlns:p="http://schemas.openxmlformats.org/presentationml/2006/main">
-  <p:cSld>
-    <p:spTree>
-      <p:nvGrpSpPr>
-        <p:cNvPr id="1" name=""/>
-        <p:cNvGrpSpPr/>
-        <p:nvPr/>
-      </p:nvGrpSpPr>
-      <p:grpSpPr>
-        <a:xfrm>
-          <a:off x="0" y="0"/>
-          <a:ext cx="0" cy="0"/>
-          <a:chOff x="0" y="0"/>
-          <a:chExt cx="0" cy="0"/>
-        </a:xfrm>
-      </p:grpSpPr>
-      <p:sp>
-        <p:nvSpPr>
-          <p:cNvPr id="2" name="Title 1">
-            <a:extLst>
-              <a:ext uri="{FF2B5EF4-FFF2-40B4-BE49-F238E27FC236}">
-                <a16:creationId xmlns:a16="http://schemas.microsoft.com/office/drawing/2014/main" id="{C8470D3D-7DCC-4CE8-B0CF-8E4265691C5B}"/>
-              </a:ext>
-            </a:extLst>
-          </p:cNvPr>
-          <p:cNvSpPr>
-            <a:spLocks noGrp="1"/>
-          </p:cNvSpPr>
-          <p:nvPr>
-            <p:ph type="title"/>
-          </p:nvPr>
-        </p:nvSpPr>
-        <p:spPr/>
-        <p:txBody>
-          <a:bodyPr/>
-          <a:lstStyle/>
-          <a:p>
-            <a:r>
-              <a:rPr lang="en-US" dirty="0"/>
-              <a:t>History &amp; GOALS</a:t>
-            </a:r>
-            <a:endParaRPr lang="it-IT" dirty="0"/>
-          </a:p>
-        </p:txBody>
-      </p:sp>
-      <p:sp>
-        <p:nvSpPr>
-          <p:cNvPr id="3" name="Content Placeholder 2">
-            <a:extLst>
-              <a:ext uri="{FF2B5EF4-FFF2-40B4-BE49-F238E27FC236}">
-                <a16:creationId xmlns:a16="http://schemas.microsoft.com/office/drawing/2014/main" id="{FDAABD4D-DD49-437B-A393-05F43BCEEC68}"/>
-              </a:ext>
-            </a:extLst>
-          </p:cNvPr>
-          <p:cNvSpPr>
-            <a:spLocks noGrp="1"/>
-          </p:cNvSpPr>
-          <p:nvPr>
-            <p:ph idx="1"/>
-          </p:nvPr>
-        </p:nvSpPr>
-        <p:spPr>
-          <a:xfrm>
-            <a:off x="179512" y="1554163"/>
-            <a:ext cx="8812088" cy="4525962"/>
-          </a:xfrm>
-        </p:spPr>
-        <p:txBody>
-          <a:bodyPr/>
-          <a:lstStyle/>
-          <a:p>
-            <a:r>
-              <a:rPr lang="it-IT" sz="2400" dirty="0" err="1"/>
-              <a:t>Since</a:t>
-            </a:r>
-            <a:r>
-              <a:rPr lang="it-IT" sz="2400" dirty="0"/>
-              <a:t> </a:t>
-            </a:r>
-            <a:r>
-              <a:rPr lang="it-IT" sz="2400" dirty="0" err="1"/>
-              <a:t>its</a:t>
-            </a:r>
-            <a:r>
-              <a:rPr lang="it-IT" sz="2400" dirty="0"/>
-              <a:t> </a:t>
-            </a:r>
-            <a:r>
-              <a:rPr lang="it-IT" sz="2400" dirty="0" err="1"/>
-              <a:t>earliest</a:t>
-            </a:r>
-            <a:r>
-              <a:rPr lang="it-IT" sz="2400" dirty="0"/>
-              <a:t> </a:t>
-            </a:r>
-            <a:r>
-              <a:rPr lang="it-IT" sz="2400" dirty="0" err="1"/>
-              <a:t>inception</a:t>
-            </a:r>
-            <a:r>
-              <a:rPr lang="it-IT" sz="2400" dirty="0"/>
-              <a:t> HTTP </a:t>
-            </a:r>
-            <a:r>
-              <a:rPr lang="it-IT" sz="2400" dirty="0" err="1"/>
-              <a:t>inventors</a:t>
-            </a:r>
-            <a:r>
-              <a:rPr lang="it-IT" sz="2400" dirty="0"/>
-              <a:t> </a:t>
-            </a:r>
-            <a:r>
-              <a:rPr lang="it-IT" sz="2400" dirty="0" err="1"/>
-              <a:t>felt</a:t>
-            </a:r>
-            <a:r>
-              <a:rPr lang="it-IT" sz="2400" dirty="0"/>
-              <a:t> the </a:t>
-            </a:r>
-            <a:r>
-              <a:rPr lang="it-IT" sz="2400" dirty="0" err="1"/>
-              <a:t>need</a:t>
-            </a:r>
-            <a:r>
-              <a:rPr lang="it-IT" sz="2400" dirty="0"/>
-              <a:t> of </a:t>
-            </a:r>
-            <a:r>
-              <a:rPr lang="it-IT" sz="2400" dirty="0" err="1"/>
-              <a:t>reassuring</a:t>
-            </a:r>
-            <a:r>
-              <a:rPr lang="it-IT" sz="2400" dirty="0"/>
-              <a:t> users so to </a:t>
-            </a:r>
-            <a:r>
-              <a:rPr lang="it-IT" sz="2400" dirty="0" err="1"/>
-              <a:t>allow</a:t>
-            </a:r>
-            <a:endParaRPr lang="it-IT" sz="2400" dirty="0"/>
-          </a:p>
-          <a:p>
-            <a:pPr lvl="1"/>
-            <a:r>
-              <a:rPr lang="it-IT" sz="2000" dirty="0"/>
-              <a:t>Secure e-commerce, secure banking, etc.</a:t>
-            </a:r>
-          </a:p>
-          <a:p>
-            <a:r>
-              <a:rPr lang="it-IT" sz="2400" dirty="0"/>
-              <a:t>Internet </a:t>
-            </a:r>
-            <a:r>
-              <a:rPr lang="it-IT" sz="2400" dirty="0" err="1"/>
-              <a:t>before</a:t>
-            </a:r>
-            <a:r>
-              <a:rPr lang="it-IT" sz="2400" dirty="0"/>
-              <a:t> SSL </a:t>
-            </a:r>
-            <a:r>
-              <a:rPr lang="it-IT" sz="2400" dirty="0" err="1"/>
-              <a:t>was</a:t>
-            </a:r>
-            <a:r>
-              <a:rPr lang="it-IT" sz="2400" dirty="0"/>
-              <a:t> a wild world</a:t>
-            </a:r>
-          </a:p>
-          <a:p>
-            <a:pPr lvl="1"/>
-            <a:r>
-              <a:rPr lang="it-IT" sz="2000" dirty="0">
-                <a:hlinkClick r:id="rId2"/>
-              </a:rPr>
-              <a:t>https://www.feistyduck.com/ssl-tls-and-pki-history/</a:t>
-            </a:r>
-            <a:endParaRPr lang="it-IT" sz="2000" dirty="0"/>
-          </a:p>
-          <a:p>
-            <a:endParaRPr lang="it-IT" sz="2400" dirty="0"/>
-          </a:p>
-          <a:p>
-            <a:endParaRPr lang="it-IT" sz="2400" dirty="0"/>
-          </a:p>
-          <a:p>
-            <a:endParaRPr lang="it-IT" sz="2400" dirty="0"/>
-          </a:p>
-          <a:p>
-            <a:r>
-              <a:rPr lang="it-IT" sz="2400" dirty="0" err="1"/>
-              <a:t>Add</a:t>
-            </a:r>
-            <a:r>
-              <a:rPr lang="it-IT" sz="2400" dirty="0"/>
-              <a:t> a </a:t>
-            </a:r>
-            <a:r>
-              <a:rPr lang="it-IT" sz="2400" dirty="0" err="1"/>
-              <a:t>safety</a:t>
-            </a:r>
-            <a:r>
-              <a:rPr lang="it-IT" sz="2400" dirty="0"/>
-              <a:t> </a:t>
-            </a:r>
-            <a:r>
-              <a:rPr lang="it-IT" sz="2400" dirty="0" err="1"/>
-              <a:t>layer</a:t>
-            </a:r>
-            <a:r>
-              <a:rPr lang="it-IT" sz="2400" dirty="0"/>
-              <a:t> in-</a:t>
-            </a:r>
-            <a:r>
-              <a:rPr lang="it-IT" sz="2400" dirty="0" err="1"/>
-              <a:t>between</a:t>
-            </a:r>
-            <a:r>
-              <a:rPr lang="it-IT" sz="2400" dirty="0"/>
-              <a:t> Layer 7 and Layer 4 </a:t>
-            </a:r>
-            <a:r>
-              <a:rPr lang="it-IT" sz="2400" dirty="0" err="1"/>
-              <a:t>conversations</a:t>
-            </a:r>
-            <a:endParaRPr lang="it-IT" sz="2400" dirty="0"/>
-          </a:p>
-          <a:p>
-            <a:pPr lvl="1"/>
-            <a:r>
-              <a:rPr lang="it-IT" sz="2000" dirty="0"/>
-              <a:t>Parties can prove </a:t>
-            </a:r>
-            <a:r>
-              <a:rPr lang="it-IT" sz="2000" dirty="0" err="1"/>
-              <a:t>their</a:t>
-            </a:r>
-            <a:r>
-              <a:rPr lang="it-IT" sz="2000" dirty="0"/>
-              <a:t> </a:t>
-            </a:r>
-            <a:r>
-              <a:rPr lang="it-IT" sz="2000" dirty="0" err="1"/>
-              <a:t>identity</a:t>
-            </a:r>
-            <a:endParaRPr lang="it-IT" sz="2000" dirty="0"/>
-          </a:p>
-          <a:p>
-            <a:pPr lvl="1"/>
-            <a:r>
-              <a:rPr lang="it-IT" sz="2000" dirty="0"/>
-              <a:t>Parties can talk </a:t>
-            </a:r>
-            <a:r>
-              <a:rPr lang="it-IT" sz="2000" dirty="0" err="1"/>
-              <a:t>confidentially</a:t>
-            </a:r>
-            <a:endParaRPr lang="it-IT" sz="2000" dirty="0"/>
-          </a:p>
-          <a:p>
-            <a:pPr lvl="1"/>
-            <a:r>
-              <a:rPr lang="it-IT" sz="2000" dirty="0"/>
-              <a:t>Parties can talk with no tampering</a:t>
-            </a:r>
-          </a:p>
-          <a:p>
-            <a:endParaRPr lang="it-IT" sz="2400" dirty="0"/>
-          </a:p>
-        </p:txBody>
-      </p:sp>
-    </p:spTree>
-    <p:extLst>
-      <p:ext uri="{BB962C8B-B14F-4D97-AF65-F5344CB8AC3E}">
-        <p14:creationId xmlns:p14="http://schemas.microsoft.com/office/powerpoint/2010/main" val="2870853085"/>
       </p:ext>
     </p:extLst>
   </p:cSld>
@@ -14415,7 +15746,7 @@
               <a:rPr lang="it-IT" dirty="0">
                 <a:effectLst/>
               </a:rPr>
-              <a:t> </a:t>
+              <a:t> TLS/</a:t>
             </a:r>
             <a:r>
               <a:rPr lang="it-IT" dirty="0" err="1"/>
@@ -14446,22 +15777,37 @@
             </a:r>
           </a:p>
           <a:p>
-            <a:endParaRPr lang="it-IT" dirty="0"/>
-          </a:p>
-          <a:p>
             <a:r>
               <a:rPr lang="it-IT" dirty="0"/>
               <a:t>CRIME</a:t>
             </a:r>
           </a:p>
           <a:p>
-            <a:endParaRPr lang="it-IT" dirty="0"/>
-          </a:p>
-          <a:p>
             <a:r>
               <a:rPr lang="it-IT" dirty="0"/>
               <a:t>BREACH</a:t>
             </a:r>
+          </a:p>
+          <a:p>
+            <a:r>
+              <a:rPr lang="it-IT" dirty="0"/>
+              <a:t>POODLE</a:t>
+            </a:r>
+          </a:p>
+          <a:p>
+            <a:r>
+              <a:rPr lang="it-IT" dirty="0"/>
+              <a:t>HEARTBLEED</a:t>
+            </a:r>
+          </a:p>
+          <a:p>
+            <a:r>
+              <a:rPr lang="it-IT" dirty="0"/>
+              <a:t>DROWN…</a:t>
+            </a:r>
+          </a:p>
+          <a:p>
+            <a:endParaRPr lang="it-IT" dirty="0"/>
           </a:p>
         </p:txBody>
       </p:sp>
@@ -14487,8 +15833,8 @@
         </p:blipFill>
         <p:spPr>
           <a:xfrm>
-            <a:off x="2771800" y="1916832"/>
-            <a:ext cx="5909057" cy="3500592"/>
+            <a:off x="3332627" y="1916832"/>
+            <a:ext cx="5348230" cy="3168352"/>
           </a:xfrm>
           <a:prstGeom prst="rect">
             <a:avLst/>

</xml_diff>

<commit_message>
Updates as of 2021
</commit_message>
<xml_diff>
--- a/slides/SSL.pptx
+++ b/slides/SSL.pptx
@@ -5,10 +5,10 @@
     <p:sldMasterId id="2147483949" r:id="rId1"/>
   </p:sldMasterIdLst>
   <p:notesMasterIdLst>
-    <p:notesMasterId r:id="rId23"/>
+    <p:notesMasterId r:id="rId24"/>
   </p:notesMasterIdLst>
   <p:handoutMasterIdLst>
-    <p:handoutMasterId r:id="rId24"/>
+    <p:handoutMasterId r:id="rId25"/>
   </p:handoutMasterIdLst>
   <p:sldIdLst>
     <p:sldId id="285" r:id="rId2"/>
@@ -32,8 +32,9 @@
     <p:sldId id="299" r:id="rId20"/>
     <p:sldId id="300" r:id="rId21"/>
     <p:sldId id="294" r:id="rId22"/>
+    <p:sldId id="307" r:id="rId23"/>
   </p:sldIdLst>
-  <p:sldSz cx="9144000" cy="6858000" type="screen4x3"/>
+  <p:sldSz cx="12192000" cy="6858000"/>
   <p:notesSz cx="6858000" cy="9144000"/>
   <p:defaultTextStyle>
     <a:defPPr>
@@ -163,12 +164,12 @@
   <p:extLst>
     <p:ext uri="{EFAFB233-063F-42B5-8137-9DF3F51BA10A}">
       <p15:sldGuideLst xmlns:p15="http://schemas.microsoft.com/office/powerpoint/2012/main">
-        <p15:guide id="1" orient="horz" pos="2160">
+        <p15:guide id="1" orient="horz" pos="2160" userDrawn="1">
           <p15:clr>
             <a:srgbClr val="A4A3A4"/>
           </p15:clr>
         </p15:guide>
-        <p15:guide id="2" pos="2880">
+        <p15:guide id="2" pos="3840" userDrawn="1">
           <p15:clr>
             <a:srgbClr val="A4A3A4"/>
           </p15:clr>
@@ -6783,8 +6784,8 @@
         </p:nvSpPr>
         <p:spPr bwMode="auto">
           <a:xfrm>
-            <a:off x="1143000" y="685800"/>
-            <a:ext cx="4572000" cy="3429000"/>
+            <a:off x="381000" y="685800"/>
+            <a:ext cx="6096000" cy="3429000"/>
           </a:xfrm>
           <a:prstGeom prst="rect">
             <a:avLst/>
@@ -7143,6 +7144,10 @@
           </p:nvPr>
         </p:nvSpPr>
         <p:spPr>
+          <a:xfrm>
+            <a:off x="381000" y="685800"/>
+            <a:ext cx="6096000" cy="3429000"/>
+          </a:xfrm>
           <a:ln/>
         </p:spPr>
       </p:sp>
@@ -7405,7 +7410,12 @@
             <p:ph type="sldImg"/>
           </p:nvPr>
         </p:nvSpPr>
-        <p:spPr/>
+        <p:spPr>
+          <a:xfrm>
+            <a:off x="381000" y="685800"/>
+            <a:ext cx="6096000" cy="3429000"/>
+          </a:xfrm>
+        </p:spPr>
       </p:sp>
       <p:sp>
         <p:nvSpPr>
@@ -7495,8 +7505,8 @@
         </p:nvSpPr>
         <p:spPr bwMode="auto">
           <a:xfrm>
-            <a:off x="514350" y="5349902"/>
-            <a:ext cx="8629650" cy="2381"/>
+            <a:off x="685800" y="5349903"/>
+            <a:ext cx="11506200" cy="2381"/>
           </a:xfrm>
           <a:prstGeom prst="line">
             <a:avLst/>
@@ -7552,8 +7562,8 @@
         </p:nvSpPr>
         <p:spPr>
           <a:xfrm>
-            <a:off x="381000" y="4853411"/>
-            <a:ext cx="8458200" cy="1222375"/>
+            <a:off x="508000" y="4853412"/>
+            <a:ext cx="11277600" cy="1222375"/>
           </a:xfrm>
         </p:spPr>
         <p:txBody>
@@ -7590,8 +7600,8 @@
         </p:nvSpPr>
         <p:spPr>
           <a:xfrm>
-            <a:off x="381000" y="3886200"/>
-            <a:ext cx="8458200" cy="914400"/>
+            <a:off x="508000" y="3886200"/>
+            <a:ext cx="11277600" cy="914400"/>
           </a:xfrm>
         </p:spPr>
         <p:txBody>
@@ -7705,8 +7715,8 @@
         </p:nvSpPr>
         <p:spPr>
           <a:xfrm>
-            <a:off x="8229600" y="6473825"/>
-            <a:ext cx="758825" cy="247650"/>
+            <a:off x="10972801" y="6473825"/>
+            <a:ext cx="1011767" cy="247650"/>
           </a:xfrm>
         </p:spPr>
         <p:txBody>
@@ -7963,8 +7973,8 @@
         </p:nvSpPr>
         <p:spPr>
           <a:xfrm>
-            <a:off x="6858000" y="549276"/>
-            <a:ext cx="1828800" cy="5851525"/>
+            <a:off x="9144000" y="549277"/>
+            <a:ext cx="2438400" cy="5851525"/>
           </a:xfrm>
         </p:spPr>
         <p:txBody>
@@ -7991,8 +8001,8 @@
         </p:nvSpPr>
         <p:spPr>
           <a:xfrm>
-            <a:off x="457200" y="549276"/>
-            <a:ext cx="6248400" cy="5851525"/>
+            <a:off x="609600" y="549277"/>
+            <a:ext cx="8331200" cy="5851525"/>
           </a:xfrm>
         </p:spPr>
         <p:txBody>
@@ -8264,8 +8274,8 @@
         </p:nvSpPr>
         <p:spPr>
           <a:xfrm>
-            <a:off x="3581400" y="76200"/>
-            <a:ext cx="2895600" cy="288925"/>
+            <a:off x="4775200" y="76201"/>
+            <a:ext cx="3860800" cy="288925"/>
           </a:xfrm>
         </p:spPr>
         <p:txBody>
@@ -8295,8 +8305,8 @@
         </p:nvSpPr>
         <p:spPr>
           <a:xfrm>
-            <a:off x="8229600" y="6473825"/>
-            <a:ext cx="758825" cy="247650"/>
+            <a:off x="10972801" y="6473825"/>
+            <a:ext cx="1011767" cy="247650"/>
           </a:xfrm>
         </p:spPr>
         <p:txBody>
@@ -8373,8 +8383,8 @@
         </p:nvSpPr>
         <p:spPr bwMode="auto">
           <a:xfrm>
-            <a:off x="514350" y="3444902"/>
-            <a:ext cx="8629650" cy="2381"/>
+            <a:off x="685800" y="3444903"/>
+            <a:ext cx="11506200" cy="2381"/>
           </a:xfrm>
           <a:prstGeom prst="line">
             <a:avLst/>
@@ -8430,8 +8440,8 @@
         </p:nvSpPr>
         <p:spPr>
           <a:xfrm>
-            <a:off x="381000" y="1676400"/>
-            <a:ext cx="8458200" cy="1219200"/>
+            <a:off x="508000" y="1676400"/>
+            <a:ext cx="11277600" cy="1219200"/>
           </a:xfrm>
         </p:spPr>
         <p:txBody>
@@ -8509,8 +8519,8 @@
         </p:nvSpPr>
         <p:spPr>
           <a:xfrm>
-            <a:off x="180475" y="2947085"/>
-            <a:ext cx="8686800" cy="1184825"/>
+            <a:off x="240633" y="2947086"/>
+            <a:ext cx="11582400" cy="1184825"/>
           </a:xfrm>
         </p:spPr>
         <p:txBody>
@@ -8656,8 +8666,8 @@
         </p:nvSpPr>
         <p:spPr>
           <a:xfrm>
-            <a:off x="301752" y="457200"/>
-            <a:ext cx="8686800" cy="841248"/>
+            <a:off x="402336" y="457200"/>
+            <a:ext cx="11582400" cy="841248"/>
           </a:xfrm>
         </p:spPr>
         <p:txBody>
@@ -8684,8 +8694,8 @@
         </p:nvSpPr>
         <p:spPr>
           <a:xfrm>
-            <a:off x="304800" y="1600200"/>
-            <a:ext cx="4191000" cy="4724400"/>
+            <a:off x="406400" y="1600200"/>
+            <a:ext cx="5588000" cy="4724400"/>
           </a:xfrm>
         </p:spPr>
         <p:txBody>
@@ -8757,8 +8767,8 @@
         </p:nvSpPr>
         <p:spPr>
           <a:xfrm>
-            <a:off x="4648200" y="1600200"/>
-            <a:ext cx="4343400" cy="4724400"/>
+            <a:off x="6197600" y="1600200"/>
+            <a:ext cx="5791200" cy="4724400"/>
           </a:xfrm>
         </p:spPr>
         <p:txBody>
@@ -8943,8 +8953,8 @@
         </p:nvSpPr>
         <p:spPr bwMode="auto">
           <a:xfrm>
-            <a:off x="514350" y="6019800"/>
-            <a:ext cx="8629650" cy="2381"/>
+            <a:off x="685800" y="6019801"/>
+            <a:ext cx="11506200" cy="2381"/>
           </a:xfrm>
           <a:prstGeom prst="line">
             <a:avLst/>
@@ -9000,8 +9010,8 @@
         </p:nvSpPr>
         <p:spPr>
           <a:xfrm>
-            <a:off x="304800" y="5410200"/>
-            <a:ext cx="8610600" cy="882650"/>
+            <a:off x="406400" y="5410200"/>
+            <a:ext cx="11480800" cy="882650"/>
           </a:xfrm>
         </p:spPr>
         <p:txBody>
@@ -9032,8 +9042,8 @@
         </p:nvSpPr>
         <p:spPr>
           <a:xfrm>
-            <a:off x="281444" y="666750"/>
-            <a:ext cx="4290556" cy="639762"/>
+            <a:off x="375259" y="666750"/>
+            <a:ext cx="5720741" cy="639762"/>
           </a:xfrm>
         </p:spPr>
         <p:txBody>
@@ -9090,8 +9100,8 @@
         </p:nvSpPr>
         <p:spPr>
           <a:xfrm>
-            <a:off x="4645025" y="666750"/>
-            <a:ext cx="4292241" cy="639762"/>
+            <a:off x="6193367" y="666750"/>
+            <a:ext cx="5722988" cy="639762"/>
           </a:xfrm>
         </p:spPr>
         <p:txBody>
@@ -9148,8 +9158,8 @@
         </p:nvSpPr>
         <p:spPr>
           <a:xfrm>
-            <a:off x="281444" y="1316037"/>
-            <a:ext cx="4290556" cy="3941763"/>
+            <a:off x="375259" y="1316038"/>
+            <a:ext cx="5720741" cy="3941763"/>
           </a:xfrm>
         </p:spPr>
         <p:txBody>
@@ -9221,8 +9231,8 @@
         </p:nvSpPr>
         <p:spPr>
           <a:xfrm>
-            <a:off x="4648730" y="1316037"/>
-            <a:ext cx="4288536" cy="3941763"/>
+            <a:off x="6198307" y="1316038"/>
+            <a:ext cx="5718048" cy="3941763"/>
           </a:xfrm>
         </p:spPr>
         <p:txBody>
@@ -9346,8 +9356,8 @@
         </p:nvSpPr>
         <p:spPr>
           <a:xfrm>
-            <a:off x="8229600" y="6477000"/>
-            <a:ext cx="762000" cy="247650"/>
+            <a:off x="10972800" y="6477000"/>
+            <a:ext cx="1016000" cy="247650"/>
           </a:xfrm>
         </p:spPr>
         <p:txBody>
@@ -9414,8 +9424,8 @@
         </p:nvSpPr>
         <p:spPr>
           <a:xfrm>
-            <a:off x="301752" y="457200"/>
-            <a:ext cx="8686800" cy="841248"/>
+            <a:off x="402336" y="457200"/>
+            <a:ext cx="11582400" cy="841248"/>
           </a:xfrm>
         </p:spPr>
         <p:txBody>
@@ -9670,8 +9680,8 @@
         </p:nvSpPr>
         <p:spPr bwMode="auto">
           <a:xfrm>
-            <a:off x="514350" y="5849117"/>
-            <a:ext cx="8629650" cy="2381"/>
+            <a:off x="685800" y="5849118"/>
+            <a:ext cx="11506200" cy="2381"/>
           </a:xfrm>
           <a:prstGeom prst="line">
             <a:avLst/>
@@ -9727,8 +9737,8 @@
         </p:nvSpPr>
         <p:spPr>
           <a:xfrm>
-            <a:off x="457200" y="5486400"/>
-            <a:ext cx="8458200" cy="520700"/>
+            <a:off x="609600" y="5486400"/>
+            <a:ext cx="11277600" cy="520700"/>
           </a:xfrm>
         </p:spPr>
         <p:txBody>
@@ -9760,8 +9770,8 @@
         </p:nvSpPr>
         <p:spPr>
           <a:xfrm>
-            <a:off x="457200" y="609600"/>
-            <a:ext cx="3008313" cy="4800600"/>
+            <a:off x="609601" y="609600"/>
+            <a:ext cx="4011084" cy="4800600"/>
           </a:xfrm>
         </p:spPr>
         <p:txBody>
@@ -9809,8 +9819,8 @@
         </p:nvSpPr>
         <p:spPr>
           <a:xfrm>
-            <a:off x="3575050" y="609600"/>
-            <a:ext cx="5340350" cy="4800600"/>
+            <a:off x="4766733" y="609600"/>
+            <a:ext cx="7120467" cy="4800600"/>
           </a:xfrm>
         </p:spPr>
         <p:txBody>
@@ -9997,8 +10007,8 @@
         </p:nvSpPr>
         <p:spPr>
           <a:xfrm>
-            <a:off x="3505200" y="616634"/>
-            <a:ext cx="5029200" cy="3657600"/>
+            <a:off x="4673600" y="616634"/>
+            <a:ext cx="6705600" cy="3657600"/>
           </a:xfrm>
           <a:solidFill>
             <a:schemeClr val="bg1"/>
@@ -10044,8 +10054,8 @@
         </p:nvSpPr>
         <p:spPr>
           <a:xfrm>
-            <a:off x="381000" y="4993760"/>
-            <a:ext cx="5867400" cy="522288"/>
+            <a:off x="508000" y="4993760"/>
+            <a:ext cx="7823200" cy="522288"/>
           </a:xfrm>
         </p:spPr>
         <p:txBody>
@@ -10077,8 +10087,8 @@
         </p:nvSpPr>
         <p:spPr>
           <a:xfrm>
-            <a:off x="381000" y="5533218"/>
-            <a:ext cx="5867400" cy="768350"/>
+            <a:off x="508000" y="5533218"/>
+            <a:ext cx="7823200" cy="768350"/>
           </a:xfrm>
         </p:spPr>
         <p:txBody>
@@ -10247,8 +10257,8 @@
         </p:nvSpPr>
         <p:spPr bwMode="auto">
           <a:xfrm>
-            <a:off x="514350" y="1050898"/>
-            <a:ext cx="8629650" cy="2381"/>
+            <a:off x="685800" y="1050899"/>
+            <a:ext cx="11506200" cy="2381"/>
           </a:xfrm>
           <a:prstGeom prst="line">
             <a:avLst/>
@@ -10304,8 +10314,8 @@
         </p:nvSpPr>
         <p:spPr bwMode="auto">
           <a:xfrm>
-            <a:off x="304800" y="1554163"/>
-            <a:ext cx="8686800" cy="4525962"/>
+            <a:off x="406400" y="1554163"/>
+            <a:ext cx="11582400" cy="4525962"/>
           </a:xfrm>
           <a:prstGeom prst="rect">
             <a:avLst/>
@@ -10391,8 +10401,8 @@
         </p:nvSpPr>
         <p:spPr>
           <a:xfrm>
-            <a:off x="6477000" y="76200"/>
-            <a:ext cx="2514600" cy="288925"/>
+            <a:off x="8636000" y="76201"/>
+            <a:ext cx="3352800" cy="288925"/>
           </a:xfrm>
           <a:prstGeom prst="rect">
             <a:avLst/>
@@ -10432,8 +10442,8 @@
         </p:nvSpPr>
         <p:spPr>
           <a:xfrm>
-            <a:off x="3124200" y="76200"/>
-            <a:ext cx="3352800" cy="288925"/>
+            <a:off x="4165600" y="76201"/>
+            <a:ext cx="4470400" cy="288925"/>
           </a:xfrm>
           <a:prstGeom prst="rect">
             <a:avLst/>
@@ -10473,8 +10483,8 @@
         </p:nvSpPr>
         <p:spPr>
           <a:xfrm>
-            <a:off x="8229600" y="6477000"/>
-            <a:ext cx="762000" cy="244475"/>
+            <a:off x="10972800" y="6477001"/>
+            <a:ext cx="1016000" cy="244475"/>
           </a:xfrm>
           <a:prstGeom prst="rect">
             <a:avLst/>
@@ -10522,8 +10532,8 @@
         </p:nvSpPr>
         <p:spPr>
           <a:xfrm>
-            <a:off x="304800" y="457200"/>
-            <a:ext cx="8686800" cy="838200"/>
+            <a:off x="406400" y="457200"/>
+            <a:ext cx="11582400" cy="838200"/>
           </a:xfrm>
           <a:prstGeom prst="rect">
             <a:avLst/>
@@ -10553,8 +10563,8 @@
         </p:nvSpPr>
         <p:spPr bwMode="auto">
           <a:xfrm>
-            <a:off x="514350" y="1050898"/>
-            <a:ext cx="8629650" cy="2381"/>
+            <a:off x="685800" y="1050899"/>
+            <a:ext cx="11506200" cy="2381"/>
           </a:xfrm>
           <a:prstGeom prst="line">
             <a:avLst/>
@@ -10608,8 +10618,8 @@
         </p:nvSpPr>
         <p:spPr bwMode="auto">
           <a:xfrm>
-            <a:off x="514350" y="1057986"/>
-            <a:ext cx="8629650" cy="2381"/>
+            <a:off x="685800" y="1057987"/>
+            <a:ext cx="11506200" cy="2381"/>
           </a:xfrm>
           <a:prstGeom prst="line">
             <a:avLst/>
@@ -11116,7 +11126,7 @@
         </p:nvSpPr>
         <p:spPr>
           <a:xfrm>
-            <a:off x="385232" y="1700808"/>
+            <a:off x="1909232" y="1700808"/>
             <a:ext cx="8458200" cy="1656184"/>
           </a:xfrm>
         </p:spPr>
@@ -11161,7 +11171,7 @@
         </p:nvSpPr>
         <p:spPr>
           <a:xfrm>
-            <a:off x="385232" y="548680"/>
+            <a:off x="1909232" y="548680"/>
             <a:ext cx="8458200" cy="914400"/>
           </a:xfrm>
         </p:spPr>
@@ -11175,8 +11185,6 @@
               <a:spcAft>
                 <a:spcPts val="0"/>
               </a:spcAft>
-              <a:buFont typeface="Wingdings 2"/>
-              <a:buNone/>
               <a:defRPr/>
             </a:pPr>
             <a:r>
@@ -11208,7 +11216,7 @@
         </p:blipFill>
         <p:spPr>
           <a:xfrm rot="21153256">
-            <a:off x="615821" y="3407268"/>
+            <a:off x="2139821" y="3407268"/>
             <a:ext cx="4669656" cy="1480948"/>
           </a:xfrm>
           <a:prstGeom prst="rect">
@@ -11470,7 +11478,7 @@
         </p:blipFill>
         <p:spPr bwMode="auto">
           <a:xfrm>
-            <a:off x="904875" y="4005064"/>
+            <a:off x="2428875" y="4005064"/>
             <a:ext cx="7334250" cy="1600200"/>
           </a:xfrm>
           <a:prstGeom prst="rect">
@@ -11536,7 +11544,7 @@
         </p:nvSpPr>
         <p:spPr>
           <a:xfrm>
-            <a:off x="4815349" y="1314450"/>
+            <a:off x="6339350" y="1314450"/>
             <a:ext cx="3841955" cy="1428750"/>
           </a:xfrm>
         </p:spPr>
@@ -11573,7 +11581,7 @@
         </p:nvSpPr>
         <p:spPr>
           <a:xfrm>
-            <a:off x="4815349" y="2743200"/>
+            <a:off x="6339350" y="2743200"/>
             <a:ext cx="3841955" cy="3206080"/>
           </a:xfrm>
         </p:spPr>
@@ -11658,7 +11666,7 @@
         </p:blipFill>
         <p:spPr>
           <a:xfrm>
-            <a:off x="483280" y="2996952"/>
+            <a:off x="2007280" y="2996953"/>
             <a:ext cx="4088720" cy="2057689"/>
           </a:xfrm>
           <a:prstGeom prst="roundRect">
@@ -11705,7 +11713,7 @@
         </p:blipFill>
         <p:spPr>
           <a:xfrm>
-            <a:off x="2061743" y="1443659"/>
+            <a:off x="3585744" y="1443660"/>
             <a:ext cx="931793" cy="931793"/>
           </a:xfrm>
           <a:prstGeom prst="rect">
@@ -11732,7 +11740,7 @@
         </p:nvSpPr>
         <p:spPr>
           <a:xfrm>
-            <a:off x="-468560" y="107784"/>
+            <a:off x="1055441" y="107784"/>
             <a:ext cx="3841955" cy="1428750"/>
           </a:xfrm>
           <a:prstGeom prst="rect">
@@ -11934,7 +11942,7 @@
         </p:nvSpPr>
         <p:spPr>
           <a:xfrm>
-            <a:off x="0" y="134325"/>
+            <a:off x="1524000" y="134325"/>
             <a:ext cx="9144000" cy="1428750"/>
           </a:xfrm>
         </p:spPr>
@@ -11976,7 +11984,7 @@
         </p:nvSpPr>
         <p:spPr>
           <a:xfrm>
-            <a:off x="293362" y="2204864"/>
+            <a:off x="1817363" y="2204865"/>
             <a:ext cx="3905729" cy="2757305"/>
           </a:xfrm>
           <a:prstGeom prst="rect">
@@ -12490,7 +12498,7 @@
         </p:blipFill>
         <p:spPr>
           <a:xfrm>
-            <a:off x="4388123" y="2494575"/>
+            <a:off x="5912123" y="2494575"/>
             <a:ext cx="4087800" cy="2089398"/>
           </a:xfrm>
           <a:prstGeom prst="roundRect">
@@ -12537,7 +12545,7 @@
         </p:blipFill>
         <p:spPr>
           <a:xfrm>
-            <a:off x="5966273" y="1563075"/>
+            <a:off x="7490273" y="1563075"/>
             <a:ext cx="931500" cy="931500"/>
           </a:xfrm>
           <a:prstGeom prst="rect">
@@ -12616,7 +12624,7 @@
         </p:blipFill>
         <p:spPr>
           <a:xfrm>
-            <a:off x="683568" y="1916832"/>
+            <a:off x="2207568" y="1916832"/>
             <a:ext cx="7823092" cy="3168352"/>
           </a:xfrm>
           <a:prstGeom prst="rect">
@@ -12632,7 +12640,7 @@
         </p:nvSpPr>
         <p:spPr>
           <a:xfrm>
-            <a:off x="656888" y="5229200"/>
+            <a:off x="2180888" y="5229200"/>
             <a:ext cx="7823092" cy="1296144"/>
           </a:xfrm>
           <a:prstGeom prst="rect">
@@ -12697,7 +12705,7 @@
         </p:nvSpPr>
         <p:spPr>
           <a:xfrm>
-            <a:off x="683568" y="2492896"/>
+            <a:off x="2207568" y="2492896"/>
             <a:ext cx="1944216" cy="576064"/>
           </a:xfrm>
           <a:prstGeom prst="roundRect">
@@ -12743,7 +12751,7 @@
         </p:nvSpPr>
         <p:spPr>
           <a:xfrm>
-            <a:off x="6732240" y="3861048"/>
+            <a:off x="8256240" y="3861048"/>
             <a:ext cx="1368152" cy="455464"/>
           </a:xfrm>
           <a:prstGeom prst="roundRect">
@@ -12997,7 +13005,7 @@
         </p:nvSpPr>
         <p:spPr>
           <a:xfrm>
-            <a:off x="304800" y="1554162"/>
+            <a:off x="1828800" y="1554163"/>
             <a:ext cx="8686800" cy="5043189"/>
           </a:xfrm>
         </p:spPr>
@@ -13121,7 +13129,7 @@
         </p:blipFill>
         <p:spPr>
           <a:xfrm>
-            <a:off x="740913" y="1628800"/>
+            <a:off x="2264913" y="1628800"/>
             <a:ext cx="7814574" cy="4112094"/>
           </a:xfrm>
           <a:prstGeom prst="rect">
@@ -13137,7 +13145,7 @@
         </p:nvSpPr>
         <p:spPr>
           <a:xfrm rot="371666">
-            <a:off x="1346902" y="4831336"/>
+            <a:off x="2870903" y="4831337"/>
             <a:ext cx="1989411" cy="390531"/>
           </a:xfrm>
           <a:prstGeom prst="wedgeRectCallout">
@@ -13346,7 +13354,7 @@
           </p:nvPr>
         </p:nvGraphicFramePr>
         <p:xfrm>
-          <a:off x="-2268760" y="1556792"/>
+          <a:off x="-744760" y="1556792"/>
           <a:ext cx="8686800" cy="4525962"/>
         </p:xfrm>
         <a:graphic>
@@ -13365,7 +13373,7 @@
         </p:nvSpPr>
         <p:spPr bwMode="auto">
           <a:xfrm>
-            <a:off x="3927805" y="1284514"/>
+            <a:off x="5451805" y="1284515"/>
             <a:ext cx="5076056" cy="5558837"/>
           </a:xfrm>
           <a:prstGeom prst="rect">
@@ -13731,7 +13739,7 @@
           </p:nvPr>
         </p:nvGraphicFramePr>
         <p:xfrm>
-          <a:off x="304800" y="1700808"/>
+          <a:off x="1828800" y="1700808"/>
           <a:ext cx="8686800" cy="4525962"/>
         </p:xfrm>
         <a:graphic>
@@ -13756,7 +13764,7 @@
         </p:nvSpPr>
         <p:spPr bwMode="auto">
           <a:xfrm>
-            <a:off x="4419600" y="3276600"/>
+            <a:off x="5943600" y="3276600"/>
             <a:ext cx="304800" cy="304800"/>
           </a:xfrm>
           <a:prstGeom prst="rect">
@@ -13898,7 +13906,7 @@
         </p:blipFill>
         <p:spPr bwMode="auto">
           <a:xfrm>
-            <a:off x="323528" y="1916832"/>
+            <a:off x="1847528" y="1916833"/>
             <a:ext cx="8432220" cy="3543275"/>
           </a:xfrm>
           <a:prstGeom prst="rect">
@@ -13993,7 +14001,7 @@
         </p:nvSpPr>
         <p:spPr>
           <a:xfrm>
-            <a:off x="179512" y="1554163"/>
+            <a:off x="1703512" y="1554163"/>
             <a:ext cx="8812088" cy="4525962"/>
           </a:xfrm>
         </p:spPr>
@@ -14275,7 +14283,7 @@
         </p:nvSpPr>
         <p:spPr>
           <a:xfrm>
-            <a:off x="206624" y="6077676"/>
+            <a:off x="1730624" y="6077676"/>
             <a:ext cx="8784976" cy="646248"/>
           </a:xfrm>
         </p:spPr>
@@ -14324,7 +14332,7 @@
         </p:blipFill>
         <p:spPr bwMode="auto">
           <a:xfrm>
-            <a:off x="1619672" y="260648"/>
+            <a:off x="3143672" y="260648"/>
             <a:ext cx="5760640" cy="5492378"/>
           </a:xfrm>
           <a:prstGeom prst="rect">
@@ -14482,6 +14490,106 @@
 </p:sld>
 </file>
 
+<file path=ppt/slides/slide22.xml><?xml version="1.0" encoding="utf-8"?>
+<p:sld xmlns:a="http://schemas.openxmlformats.org/drawingml/2006/main" xmlns:r="http://schemas.openxmlformats.org/officeDocument/2006/relationships" xmlns:p="http://schemas.openxmlformats.org/presentationml/2006/main">
+  <p:cSld>
+    <p:spTree>
+      <p:nvGrpSpPr>
+        <p:cNvPr id="1" name=""/>
+        <p:cNvGrpSpPr/>
+        <p:nvPr/>
+      </p:nvGrpSpPr>
+      <p:grpSpPr>
+        <a:xfrm>
+          <a:off x="0" y="0"/>
+          <a:ext cx="0" cy="0"/>
+          <a:chOff x="0" y="0"/>
+          <a:chExt cx="0" cy="0"/>
+        </a:xfrm>
+      </p:grpSpPr>
+      <p:sp>
+        <p:nvSpPr>
+          <p:cNvPr id="2" name="Title 1">
+            <a:extLst>
+              <a:ext uri="{FF2B5EF4-FFF2-40B4-BE49-F238E27FC236}">
+                <a16:creationId xmlns:a16="http://schemas.microsoft.com/office/drawing/2014/main" id="{DD1BF0B9-15BC-407A-B887-3A5B7693E505}"/>
+              </a:ext>
+            </a:extLst>
+          </p:cNvPr>
+          <p:cNvSpPr>
+            <a:spLocks noGrp="1"/>
+          </p:cNvSpPr>
+          <p:nvPr>
+            <p:ph type="title"/>
+          </p:nvPr>
+        </p:nvSpPr>
+        <p:spPr/>
+        <p:txBody>
+          <a:bodyPr/>
+          <a:lstStyle/>
+          <a:p>
+            <a:r>
+              <a:rPr lang="en-US" dirty="0"/>
+              <a:t>The LESSONS TO LEARN</a:t>
+            </a:r>
+            <a:endParaRPr lang="it-IT" dirty="0"/>
+          </a:p>
+        </p:txBody>
+      </p:sp>
+      <p:sp>
+        <p:nvSpPr>
+          <p:cNvPr id="3" name="Content Placeholder 2">
+            <a:extLst>
+              <a:ext uri="{FF2B5EF4-FFF2-40B4-BE49-F238E27FC236}">
+                <a16:creationId xmlns:a16="http://schemas.microsoft.com/office/drawing/2014/main" id="{CD0472E2-9276-413B-8E48-757F555FDF73}"/>
+              </a:ext>
+            </a:extLst>
+          </p:cNvPr>
+          <p:cNvSpPr>
+            <a:spLocks noGrp="1"/>
+          </p:cNvSpPr>
+          <p:nvPr>
+            <p:ph idx="1"/>
+          </p:nvPr>
+        </p:nvSpPr>
+        <p:spPr/>
+        <p:txBody>
+          <a:bodyPr/>
+          <a:lstStyle/>
+          <a:p>
+            <a:r>
+              <a:rPr lang="en-US" dirty="0"/>
+              <a:t>Follow updates on TLS security very carefully</a:t>
+            </a:r>
+          </a:p>
+          <a:p>
+            <a:r>
+              <a:rPr lang="en-US" dirty="0"/>
+              <a:t>Balance compatibility with security</a:t>
+            </a:r>
+          </a:p>
+          <a:p>
+            <a:r>
+              <a:rPr lang="en-US" dirty="0"/>
+              <a:t>HTTP must be deprecated ALWAYS, not just for what you believe is a “delicate” web site</a:t>
+            </a:r>
+            <a:endParaRPr lang="it-IT" dirty="0"/>
+          </a:p>
+        </p:txBody>
+      </p:sp>
+    </p:spTree>
+    <p:extLst>
+      <p:ext uri="{BB962C8B-B14F-4D97-AF65-F5344CB8AC3E}">
+        <p14:creationId xmlns:p14="http://schemas.microsoft.com/office/powerpoint/2010/main" val="213110330"/>
+      </p:ext>
+    </p:extLst>
+  </p:cSld>
+  <p:clrMapOvr>
+    <a:masterClrMapping/>
+  </p:clrMapOvr>
+</p:sld>
+</file>
+
 <file path=ppt/slides/slide3.xml><?xml version="1.0" encoding="utf-8"?>
 <p:sld xmlns:a="http://schemas.openxmlformats.org/drawingml/2006/main" xmlns:r="http://schemas.openxmlformats.org/officeDocument/2006/relationships" xmlns:p="http://schemas.openxmlformats.org/presentationml/2006/main">
   <p:cSld>
@@ -14567,7 +14675,7 @@
         </p:nvSpPr>
         <p:spPr>
           <a:xfrm>
-            <a:off x="467544" y="5197732"/>
+            <a:off x="1991544" y="5197732"/>
             <a:ext cx="6048466" cy="369332"/>
           </a:xfrm>
           <a:prstGeom prst="rect">
@@ -14618,7 +14726,7 @@
         </p:blipFill>
         <p:spPr bwMode="auto">
           <a:xfrm>
-            <a:off x="147638" y="1885950"/>
+            <a:off x="1671639" y="1885950"/>
             <a:ext cx="8848725" cy="3086100"/>
           </a:xfrm>
           <a:prstGeom prst="rect">
@@ -14711,7 +14819,7 @@
         </p:blipFill>
         <p:spPr>
           <a:xfrm>
-            <a:off x="2915816" y="1554163"/>
+            <a:off x="4439816" y="1554164"/>
             <a:ext cx="3789082" cy="5117891"/>
           </a:xfrm>
           <a:prstGeom prst="rect">
@@ -14832,7 +14940,7 @@
         </p:blipFill>
         <p:spPr bwMode="auto">
           <a:xfrm>
-            <a:off x="683568" y="2015275"/>
+            <a:off x="2207569" y="2015276"/>
             <a:ext cx="8052149" cy="2925893"/>
           </a:xfrm>
           <a:prstGeom prst="rect">
@@ -14940,7 +15048,7 @@
         </p:blipFill>
         <p:spPr bwMode="auto">
           <a:xfrm>
-            <a:off x="1547664" y="1844824"/>
+            <a:off x="3071664" y="1844825"/>
             <a:ext cx="5054142" cy="3808347"/>
           </a:xfrm>
           <a:prstGeom prst="rect">
@@ -14972,7 +15080,7 @@
         </p:nvCxnSpPr>
         <p:spPr>
           <a:xfrm flipH="1">
-            <a:off x="4572000" y="1556792"/>
+            <a:off x="6096000" y="1556793"/>
             <a:ext cx="2808312" cy="692593"/>
           </a:xfrm>
           <a:prstGeom prst="straightConnector1">
@@ -15011,7 +15119,7 @@
         </p:nvSpPr>
         <p:spPr>
           <a:xfrm>
-            <a:off x="6876256" y="1718422"/>
+            <a:off x="8400257" y="1718422"/>
             <a:ext cx="1928733" cy="369332"/>
           </a:xfrm>
           <a:prstGeom prst="rect">
@@ -15047,7 +15155,7 @@
         </p:nvSpPr>
         <p:spPr>
           <a:xfrm>
-            <a:off x="395536" y="6017929"/>
+            <a:off x="1919536" y="6017929"/>
             <a:ext cx="3300904" cy="369332"/>
           </a:xfrm>
           <a:prstGeom prst="rect">
@@ -15137,7 +15245,7 @@
         </p:nvSpPr>
         <p:spPr>
           <a:xfrm>
-            <a:off x="5217538" y="1554163"/>
+            <a:off x="6741538" y="1554163"/>
             <a:ext cx="3926462" cy="4525962"/>
           </a:xfrm>
         </p:spPr>
@@ -15425,7 +15533,7 @@
         </p:blipFill>
         <p:spPr>
           <a:xfrm>
-            <a:off x="304800" y="2420888"/>
+            <a:off x="1828800" y="2420888"/>
             <a:ext cx="4843264" cy="3003996"/>
           </a:xfrm>
           <a:prstGeom prst="rect">
@@ -15679,7 +15787,7 @@
         </p:blipFill>
         <p:spPr>
           <a:xfrm>
-            <a:off x="339080" y="5214018"/>
+            <a:off x="1863080" y="5214019"/>
             <a:ext cx="8497540" cy="866107"/>
           </a:xfrm>
           <a:prstGeom prst="rect">
@@ -15833,7 +15941,7 @@
         </p:blipFill>
         <p:spPr>
           <a:xfrm>
-            <a:off x="3332627" y="1916832"/>
+            <a:off x="4856627" y="1916832"/>
             <a:ext cx="5348230" cy="3168352"/>
           </a:xfrm>
           <a:prstGeom prst="rect">

</xml_diff>